<commit_message>
basic genetics title slide
</commit_message>
<xml_diff>
--- a/SolvingNimsGame.pptx
+++ b/SolvingNimsGame.pptx
@@ -4,8 +4,12 @@
   <p:sldMasterIdLst>
     <p:sldMasterId id="2147483648" r:id="rId1"/>
   </p:sldMasterIdLst>
+  <p:notesMasterIdLst>
+    <p:notesMasterId r:id="rId4"/>
+  </p:notesMasterIdLst>
   <p:sldIdLst>
     <p:sldId id="258" r:id="rId2"/>
+    <p:sldId id="259" r:id="rId3"/>
   </p:sldIdLst>
   <p:sldSz cx="12192000" cy="6858000"/>
   <p:notesSz cx="6858000" cy="9144000"/>
@@ -105,6 +109,355 @@
     </a:lvl9pPr>
   </p:defaultTextStyle>
 </p:presentation>
+</file>
+
+<file path=ppt/notesMasters/notesMaster1.xml><?xml version="1.0" encoding="utf-8"?>
+<p:notesMaster xmlns:a="http://schemas.openxmlformats.org/drawingml/2006/main" xmlns:r="http://schemas.openxmlformats.org/officeDocument/2006/relationships" xmlns:p="http://schemas.openxmlformats.org/presentationml/2006/main">
+  <p:cSld>
+    <p:bg>
+      <p:bgRef idx="1001">
+        <a:schemeClr val="bg1"/>
+      </p:bgRef>
+    </p:bg>
+    <p:spTree>
+      <p:nvGrpSpPr>
+        <p:cNvPr id="1" name=""/>
+        <p:cNvGrpSpPr/>
+        <p:nvPr/>
+      </p:nvGrpSpPr>
+      <p:grpSpPr>
+        <a:xfrm>
+          <a:off x="0" y="0"/>
+          <a:ext cx="0" cy="0"/>
+          <a:chOff x="0" y="0"/>
+          <a:chExt cx="0" cy="0"/>
+        </a:xfrm>
+      </p:grpSpPr>
+      <p:sp>
+        <p:nvSpPr>
+          <p:cNvPr id="2" name="Header Placeholder 1"/>
+          <p:cNvSpPr>
+            <a:spLocks noGrp="1"/>
+          </p:cNvSpPr>
+          <p:nvPr>
+            <p:ph type="hdr" sz="quarter"/>
+          </p:nvPr>
+        </p:nvSpPr>
+        <p:spPr>
+          <a:xfrm>
+            <a:off x="0" y="0"/>
+            <a:ext cx="2971800" cy="458788"/>
+          </a:xfrm>
+          <a:prstGeom prst="rect">
+            <a:avLst/>
+          </a:prstGeom>
+        </p:spPr>
+        <p:txBody>
+          <a:bodyPr vert="horz" lIns="91440" tIns="45720" rIns="91440" bIns="45720" rtlCol="0"/>
+          <a:lstStyle>
+            <a:lvl1pPr algn="l">
+              <a:defRPr sz="1200"/>
+            </a:lvl1pPr>
+          </a:lstStyle>
+          <a:p>
+            <a:endParaRPr lang="en-GB"/>
+          </a:p>
+        </p:txBody>
+      </p:sp>
+      <p:sp>
+        <p:nvSpPr>
+          <p:cNvPr id="3" name="Date Placeholder 2"/>
+          <p:cNvSpPr>
+            <a:spLocks noGrp="1"/>
+          </p:cNvSpPr>
+          <p:nvPr>
+            <p:ph type="dt" idx="1"/>
+          </p:nvPr>
+        </p:nvSpPr>
+        <p:spPr>
+          <a:xfrm>
+            <a:off x="3884613" y="0"/>
+            <a:ext cx="2971800" cy="458788"/>
+          </a:xfrm>
+          <a:prstGeom prst="rect">
+            <a:avLst/>
+          </a:prstGeom>
+        </p:spPr>
+        <p:txBody>
+          <a:bodyPr vert="horz" lIns="91440" tIns="45720" rIns="91440" bIns="45720" rtlCol="0"/>
+          <a:lstStyle>
+            <a:lvl1pPr algn="r">
+              <a:defRPr sz="1200"/>
+            </a:lvl1pPr>
+          </a:lstStyle>
+          <a:p>
+            <a:fld id="{62D09690-1FFB-42DB-9255-302DE4423BC8}" type="datetimeFigureOut">
+              <a:rPr lang="en-GB" smtClean="0"/>
+              <a:t>12/01/2023</a:t>
+            </a:fld>
+            <a:endParaRPr lang="en-GB"/>
+          </a:p>
+        </p:txBody>
+      </p:sp>
+      <p:sp>
+        <p:nvSpPr>
+          <p:cNvPr id="4" name="Slide Image Placeholder 3"/>
+          <p:cNvSpPr>
+            <a:spLocks noGrp="1" noRot="1" noChangeAspect="1"/>
+          </p:cNvSpPr>
+          <p:nvPr>
+            <p:ph type="sldImg" idx="2"/>
+          </p:nvPr>
+        </p:nvSpPr>
+        <p:spPr>
+          <a:xfrm>
+            <a:off x="685800" y="1143000"/>
+            <a:ext cx="5486400" cy="3086100"/>
+          </a:xfrm>
+          <a:prstGeom prst="rect">
+            <a:avLst/>
+          </a:prstGeom>
+          <a:noFill/>
+          <a:ln w="12700">
+            <a:solidFill>
+              <a:prstClr val="black"/>
+            </a:solidFill>
+          </a:ln>
+        </p:spPr>
+        <p:txBody>
+          <a:bodyPr vert="horz" lIns="91440" tIns="45720" rIns="91440" bIns="45720" rtlCol="0" anchor="ctr"/>
+          <a:lstStyle/>
+          <a:p>
+            <a:endParaRPr lang="en-GB"/>
+          </a:p>
+        </p:txBody>
+      </p:sp>
+      <p:sp>
+        <p:nvSpPr>
+          <p:cNvPr id="5" name="Notes Placeholder 4"/>
+          <p:cNvSpPr>
+            <a:spLocks noGrp="1"/>
+          </p:cNvSpPr>
+          <p:nvPr>
+            <p:ph type="body" sz="quarter" idx="3"/>
+          </p:nvPr>
+        </p:nvSpPr>
+        <p:spPr>
+          <a:xfrm>
+            <a:off x="685800" y="4400550"/>
+            <a:ext cx="5486400" cy="3600450"/>
+          </a:xfrm>
+          <a:prstGeom prst="rect">
+            <a:avLst/>
+          </a:prstGeom>
+        </p:spPr>
+        <p:txBody>
+          <a:bodyPr vert="horz" lIns="91440" tIns="45720" rIns="91440" bIns="45720" rtlCol="0"/>
+          <a:lstStyle/>
+          <a:p>
+            <a:pPr lvl="0"/>
+            <a:r>
+              <a:rPr lang="en-GB"/>
+              <a:t>Click to edit Master text styles</a:t>
+            </a:r>
+          </a:p>
+          <a:p>
+            <a:pPr lvl="1"/>
+            <a:r>
+              <a:rPr lang="en-GB"/>
+              <a:t>Second level</a:t>
+            </a:r>
+          </a:p>
+          <a:p>
+            <a:pPr lvl="2"/>
+            <a:r>
+              <a:rPr lang="en-GB"/>
+              <a:t>Third level</a:t>
+            </a:r>
+          </a:p>
+          <a:p>
+            <a:pPr lvl="3"/>
+            <a:r>
+              <a:rPr lang="en-GB"/>
+              <a:t>Fourth level</a:t>
+            </a:r>
+          </a:p>
+          <a:p>
+            <a:pPr lvl="4"/>
+            <a:r>
+              <a:rPr lang="en-GB"/>
+              <a:t>Fifth level</a:t>
+            </a:r>
+          </a:p>
+        </p:txBody>
+      </p:sp>
+      <p:sp>
+        <p:nvSpPr>
+          <p:cNvPr id="6" name="Footer Placeholder 5"/>
+          <p:cNvSpPr>
+            <a:spLocks noGrp="1"/>
+          </p:cNvSpPr>
+          <p:nvPr>
+            <p:ph type="ftr" sz="quarter" idx="4"/>
+          </p:nvPr>
+        </p:nvSpPr>
+        <p:spPr>
+          <a:xfrm>
+            <a:off x="0" y="8685213"/>
+            <a:ext cx="2971800" cy="458787"/>
+          </a:xfrm>
+          <a:prstGeom prst="rect">
+            <a:avLst/>
+          </a:prstGeom>
+        </p:spPr>
+        <p:txBody>
+          <a:bodyPr vert="horz" lIns="91440" tIns="45720" rIns="91440" bIns="45720" rtlCol="0" anchor="b"/>
+          <a:lstStyle>
+            <a:lvl1pPr algn="l">
+              <a:defRPr sz="1200"/>
+            </a:lvl1pPr>
+          </a:lstStyle>
+          <a:p>
+            <a:endParaRPr lang="en-GB"/>
+          </a:p>
+        </p:txBody>
+      </p:sp>
+      <p:sp>
+        <p:nvSpPr>
+          <p:cNvPr id="7" name="Slide Number Placeholder 6"/>
+          <p:cNvSpPr>
+            <a:spLocks noGrp="1"/>
+          </p:cNvSpPr>
+          <p:nvPr>
+            <p:ph type="sldNum" sz="quarter" idx="5"/>
+          </p:nvPr>
+        </p:nvSpPr>
+        <p:spPr>
+          <a:xfrm>
+            <a:off x="3884613" y="8685213"/>
+            <a:ext cx="2971800" cy="458787"/>
+          </a:xfrm>
+          <a:prstGeom prst="rect">
+            <a:avLst/>
+          </a:prstGeom>
+        </p:spPr>
+        <p:txBody>
+          <a:bodyPr vert="horz" lIns="91440" tIns="45720" rIns="91440" bIns="45720" rtlCol="0" anchor="b"/>
+          <a:lstStyle>
+            <a:lvl1pPr algn="r">
+              <a:defRPr sz="1200"/>
+            </a:lvl1pPr>
+          </a:lstStyle>
+          <a:p>
+            <a:fld id="{B3388FBB-98E4-4C62-99AB-E6602312ADC3}" type="slidenum">
+              <a:rPr lang="en-GB" smtClean="0"/>
+              <a:t>‹#›</a:t>
+            </a:fld>
+            <a:endParaRPr lang="en-GB"/>
+          </a:p>
+        </p:txBody>
+      </p:sp>
+    </p:spTree>
+    <p:extLst>
+      <p:ext uri="{BB962C8B-B14F-4D97-AF65-F5344CB8AC3E}">
+        <p14:creationId xmlns:p14="http://schemas.microsoft.com/office/powerpoint/2010/main" val="3970811161"/>
+      </p:ext>
+    </p:extLst>
+  </p:cSld>
+  <p:clrMap bg1="lt1" tx1="dk1" bg2="lt2" tx2="dk2" accent1="accent1" accent2="accent2" accent3="accent3" accent4="accent4" accent5="accent5" accent6="accent6" hlink="hlink" folHlink="folHlink"/>
+  <p:notesStyle>
+    <a:lvl1pPr marL="0" algn="l" defTabSz="914400" rtl="0" eaLnBrk="1" latinLnBrk="0" hangingPunct="1">
+      <a:defRPr sz="1200" kern="1200">
+        <a:solidFill>
+          <a:schemeClr val="tx1"/>
+        </a:solidFill>
+        <a:latin typeface="+mn-lt"/>
+        <a:ea typeface="+mn-ea"/>
+        <a:cs typeface="+mn-cs"/>
+      </a:defRPr>
+    </a:lvl1pPr>
+    <a:lvl2pPr marL="457200" algn="l" defTabSz="914400" rtl="0" eaLnBrk="1" latinLnBrk="0" hangingPunct="1">
+      <a:defRPr sz="1200" kern="1200">
+        <a:solidFill>
+          <a:schemeClr val="tx1"/>
+        </a:solidFill>
+        <a:latin typeface="+mn-lt"/>
+        <a:ea typeface="+mn-ea"/>
+        <a:cs typeface="+mn-cs"/>
+      </a:defRPr>
+    </a:lvl2pPr>
+    <a:lvl3pPr marL="914400" algn="l" defTabSz="914400" rtl="0" eaLnBrk="1" latinLnBrk="0" hangingPunct="1">
+      <a:defRPr sz="1200" kern="1200">
+        <a:solidFill>
+          <a:schemeClr val="tx1"/>
+        </a:solidFill>
+        <a:latin typeface="+mn-lt"/>
+        <a:ea typeface="+mn-ea"/>
+        <a:cs typeface="+mn-cs"/>
+      </a:defRPr>
+    </a:lvl3pPr>
+    <a:lvl4pPr marL="1371600" algn="l" defTabSz="914400" rtl="0" eaLnBrk="1" latinLnBrk="0" hangingPunct="1">
+      <a:defRPr sz="1200" kern="1200">
+        <a:solidFill>
+          <a:schemeClr val="tx1"/>
+        </a:solidFill>
+        <a:latin typeface="+mn-lt"/>
+        <a:ea typeface="+mn-ea"/>
+        <a:cs typeface="+mn-cs"/>
+      </a:defRPr>
+    </a:lvl4pPr>
+    <a:lvl5pPr marL="1828800" algn="l" defTabSz="914400" rtl="0" eaLnBrk="1" latinLnBrk="0" hangingPunct="1">
+      <a:defRPr sz="1200" kern="1200">
+        <a:solidFill>
+          <a:schemeClr val="tx1"/>
+        </a:solidFill>
+        <a:latin typeface="+mn-lt"/>
+        <a:ea typeface="+mn-ea"/>
+        <a:cs typeface="+mn-cs"/>
+      </a:defRPr>
+    </a:lvl5pPr>
+    <a:lvl6pPr marL="2286000" algn="l" defTabSz="914400" rtl="0" eaLnBrk="1" latinLnBrk="0" hangingPunct="1">
+      <a:defRPr sz="1200" kern="1200">
+        <a:solidFill>
+          <a:schemeClr val="tx1"/>
+        </a:solidFill>
+        <a:latin typeface="+mn-lt"/>
+        <a:ea typeface="+mn-ea"/>
+        <a:cs typeface="+mn-cs"/>
+      </a:defRPr>
+    </a:lvl6pPr>
+    <a:lvl7pPr marL="2743200" algn="l" defTabSz="914400" rtl="0" eaLnBrk="1" latinLnBrk="0" hangingPunct="1">
+      <a:defRPr sz="1200" kern="1200">
+        <a:solidFill>
+          <a:schemeClr val="tx1"/>
+        </a:solidFill>
+        <a:latin typeface="+mn-lt"/>
+        <a:ea typeface="+mn-ea"/>
+        <a:cs typeface="+mn-cs"/>
+      </a:defRPr>
+    </a:lvl7pPr>
+    <a:lvl8pPr marL="3200400" algn="l" defTabSz="914400" rtl="0" eaLnBrk="1" latinLnBrk="0" hangingPunct="1">
+      <a:defRPr sz="1200" kern="1200">
+        <a:solidFill>
+          <a:schemeClr val="tx1"/>
+        </a:solidFill>
+        <a:latin typeface="+mn-lt"/>
+        <a:ea typeface="+mn-ea"/>
+        <a:cs typeface="+mn-cs"/>
+      </a:defRPr>
+    </a:lvl8pPr>
+    <a:lvl9pPr marL="3657600" algn="l" defTabSz="914400" rtl="0" eaLnBrk="1" latinLnBrk="0" hangingPunct="1">
+      <a:defRPr sz="1200" kern="1200">
+        <a:solidFill>
+          <a:schemeClr val="tx1"/>
+        </a:solidFill>
+        <a:latin typeface="+mn-lt"/>
+        <a:ea typeface="+mn-ea"/>
+        <a:cs typeface="+mn-cs"/>
+      </a:defRPr>
+    </a:lvl9pPr>
+  </p:notesStyle>
+</p:notesMaster>
 </file>
 
 <file path=ppt/slideLayouts/slideLayout1.xml><?xml version="1.0" encoding="utf-8"?>
@@ -3659,6 +4012,347 @@
 </p:sld>
 </file>
 
+<file path=ppt/slides/slide2.xml><?xml version="1.0" encoding="utf-8"?>
+<p:sld xmlns:a="http://schemas.openxmlformats.org/drawingml/2006/main" xmlns:r="http://schemas.openxmlformats.org/officeDocument/2006/relationships" xmlns:p="http://schemas.openxmlformats.org/presentationml/2006/main">
+  <p:cSld>
+    <p:bg>
+      <p:bgPr>
+        <a:solidFill>
+          <a:schemeClr val="bg1"/>
+        </a:solidFill>
+        <a:effectLst/>
+      </p:bgPr>
+    </p:bg>
+    <p:spTree>
+      <p:nvGrpSpPr>
+        <p:cNvPr id="1" name=""/>
+        <p:cNvGrpSpPr/>
+        <p:nvPr/>
+      </p:nvGrpSpPr>
+      <p:grpSpPr>
+        <a:xfrm>
+          <a:off x="0" y="0"/>
+          <a:ext cx="0" cy="0"/>
+          <a:chOff x="0" y="0"/>
+          <a:chExt cx="0" cy="0"/>
+        </a:xfrm>
+      </p:grpSpPr>
+      <p:pic>
+        <p:nvPicPr>
+          <p:cNvPr id="4" name="Image 9" descr="Une image contenant regardant, jeune, oiseau, debout&#10;&#10;Description générée automatiquement">
+            <a:extLst>
+              <a:ext uri="{FF2B5EF4-FFF2-40B4-BE49-F238E27FC236}">
+                <a16:creationId xmlns:a16="http://schemas.microsoft.com/office/drawing/2014/main" id="{0DAA81E7-7A28-6FB7-BAAA-C0E1F175DA4A}"/>
+              </a:ext>
+            </a:extLst>
+          </p:cNvPr>
+          <p:cNvPicPr>
+            <a:picLocks noChangeAspect="1"/>
+          </p:cNvPicPr>
+          <p:nvPr/>
+        </p:nvPicPr>
+        <p:blipFill rotWithShape="1">
+          <a:blip r:embed="rId2">
+            <a:extLst>
+              <a:ext uri="{28A0092B-C50C-407E-A947-70E740481C1C}">
+                <a14:useLocalDpi xmlns:a14="http://schemas.microsoft.com/office/drawing/2010/main" val="0"/>
+              </a:ext>
+            </a:extLst>
+          </a:blip>
+          <a:srcRect l="3144" r="7967"/>
+          <a:stretch/>
+        </p:blipFill>
+        <p:spPr>
+          <a:xfrm>
+            <a:off x="20" y="10"/>
+            <a:ext cx="12191980" cy="6857990"/>
+          </a:xfrm>
+          <a:prstGeom prst="rect">
+            <a:avLst/>
+          </a:prstGeom>
+        </p:spPr>
+      </p:pic>
+      <p:sp>
+        <p:nvSpPr>
+          <p:cNvPr id="9" name="Freeform 5">
+            <a:extLst>
+              <a:ext uri="{FF2B5EF4-FFF2-40B4-BE49-F238E27FC236}">
+                <a16:creationId xmlns:a16="http://schemas.microsoft.com/office/drawing/2014/main" id="{87CC2527-562A-4F69-B487-4371E5B243E7}"/>
+              </a:ext>
+              <a:ext uri="{C183D7F6-B498-43B3-948B-1728B52AA6E4}">
+                <adec:decorative xmlns:adec="http://schemas.microsoft.com/office/drawing/2017/decorative" val="1"/>
+              </a:ext>
+            </a:extLst>
+          </p:cNvPr>
+          <p:cNvSpPr>
+            <a:spLocks noGrp="1" noRot="1" noChangeAspect="1" noMove="1" noResize="1" noEditPoints="1" noAdjustHandles="1" noChangeArrowheads="1" noChangeShapeType="1" noTextEdit="1"/>
+          </p:cNvSpPr>
+          <p:nvPr>
+            <p:extLst>
+              <p:ext uri="{386F3935-93C4-4BCD-93E2-E3B085C9AB24}">
+                <p16:designElem xmlns:p16="http://schemas.microsoft.com/office/powerpoint/2015/main" val="1"/>
+              </p:ext>
+            </p:extLst>
+          </p:nvPr>
+        </p:nvSpPr>
+        <p:spPr bwMode="grayWhite">
+          <a:xfrm>
+            <a:off x="7488621" y="2277613"/>
+            <a:ext cx="4703379" cy="4580387"/>
+          </a:xfrm>
+          <a:custGeom>
+            <a:avLst/>
+            <a:gdLst>
+              <a:gd name="T0" fmla="*/ 1333 w 1333"/>
+              <a:gd name="T1" fmla="*/ 1031 h 1298"/>
+              <a:gd name="T2" fmla="*/ 1333 w 1333"/>
+              <a:gd name="T3" fmla="*/ 380 h 1298"/>
+              <a:gd name="T4" fmla="*/ 706 w 1333"/>
+              <a:gd name="T5" fmla="*/ 0 h 1298"/>
+              <a:gd name="T6" fmla="*/ 0 w 1333"/>
+              <a:gd name="T7" fmla="*/ 706 h 1298"/>
+              <a:gd name="T8" fmla="*/ 323 w 1333"/>
+              <a:gd name="T9" fmla="*/ 1298 h 1298"/>
+              <a:gd name="T10" fmla="*/ 1090 w 1333"/>
+              <a:gd name="T11" fmla="*/ 1298 h 1298"/>
+              <a:gd name="T12" fmla="*/ 1333 w 1333"/>
+              <a:gd name="T13" fmla="*/ 1031 h 1298"/>
+            </a:gdLst>
+            <a:ahLst/>
+            <a:cxnLst>
+              <a:cxn ang="0">
+                <a:pos x="T0" y="T1"/>
+              </a:cxn>
+              <a:cxn ang="0">
+                <a:pos x="T2" y="T3"/>
+              </a:cxn>
+              <a:cxn ang="0">
+                <a:pos x="T4" y="T5"/>
+              </a:cxn>
+              <a:cxn ang="0">
+                <a:pos x="T6" y="T7"/>
+              </a:cxn>
+              <a:cxn ang="0">
+                <a:pos x="T8" y="T9"/>
+              </a:cxn>
+              <a:cxn ang="0">
+                <a:pos x="T10" y="T11"/>
+              </a:cxn>
+              <a:cxn ang="0">
+                <a:pos x="T12" y="T13"/>
+              </a:cxn>
+            </a:cxnLst>
+            <a:rect l="0" t="0" r="r" b="b"/>
+            <a:pathLst>
+              <a:path w="1333" h="1298">
+                <a:moveTo>
+                  <a:pt x="1333" y="1031"/>
+                </a:moveTo>
+                <a:cubicBezTo>
+                  <a:pt x="1333" y="380"/>
+                  <a:pt x="1333" y="380"/>
+                  <a:pt x="1333" y="380"/>
+                </a:cubicBezTo>
+                <a:cubicBezTo>
+                  <a:pt x="1215" y="154"/>
+                  <a:pt x="979" y="0"/>
+                  <a:pt x="706" y="0"/>
+                </a:cubicBezTo>
+                <a:cubicBezTo>
+                  <a:pt x="317" y="0"/>
+                  <a:pt x="0" y="316"/>
+                  <a:pt x="0" y="706"/>
+                </a:cubicBezTo>
+                <a:cubicBezTo>
+                  <a:pt x="0" y="954"/>
+                  <a:pt x="129" y="1172"/>
+                  <a:pt x="323" y="1298"/>
+                </a:cubicBezTo>
+                <a:cubicBezTo>
+                  <a:pt x="1090" y="1298"/>
+                  <a:pt x="1090" y="1298"/>
+                  <a:pt x="1090" y="1298"/>
+                </a:cubicBezTo>
+                <a:cubicBezTo>
+                  <a:pt x="1193" y="1232"/>
+                  <a:pt x="1276" y="1140"/>
+                  <a:pt x="1333" y="1031"/>
+                </a:cubicBezTo>
+                <a:close/>
+              </a:path>
+            </a:pathLst>
+          </a:custGeom>
+          <a:solidFill>
+            <a:schemeClr val="bg1">
+              <a:alpha val="70000"/>
+            </a:schemeClr>
+          </a:solidFill>
+          <a:ln w="50800" cap="sq" cmpd="dbl">
+            <a:noFill/>
+            <a:miter lim="800000"/>
+          </a:ln>
+          <a:effectLst/>
+        </p:spPr>
+        <p:txBody>
+          <a:bodyPr vert="horz" lIns="91440" tIns="45720" rIns="91440" bIns="45720" rtlCol="0" anchor="t">
+            <a:normAutofit/>
+          </a:bodyPr>
+          <a:lstStyle/>
+          <a:p>
+            <a:pPr algn="ctr">
+              <a:spcAft>
+                <a:spcPts val="1000"/>
+              </a:spcAft>
+              <a:buClr>
+                <a:schemeClr val="tx1"/>
+              </a:buClr>
+              <a:buSzPct val="100000"/>
+              <a:buFont typeface="Arial"/>
+              <a:buNone/>
+            </a:pPr>
+            <a:endParaRPr lang="en-US" sz="1600" cap="all"/>
+          </a:p>
+        </p:txBody>
+      </p:sp>
+      <p:sp>
+        <p:nvSpPr>
+          <p:cNvPr id="2" name="Title 1">
+            <a:extLst>
+              <a:ext uri="{FF2B5EF4-FFF2-40B4-BE49-F238E27FC236}">
+                <a16:creationId xmlns:a16="http://schemas.microsoft.com/office/drawing/2014/main" id="{13A5E9D9-0AE6-A7D1-95A1-81F661E466EF}"/>
+              </a:ext>
+            </a:extLst>
+          </p:cNvPr>
+          <p:cNvSpPr>
+            <a:spLocks noGrp="1"/>
+          </p:cNvSpPr>
+          <p:nvPr>
+            <p:ph type="ctrTitle"/>
+          </p:nvPr>
+        </p:nvSpPr>
+        <p:spPr>
+          <a:xfrm>
+            <a:off x="8022021" y="3231931"/>
+            <a:ext cx="3852041" cy="1834056"/>
+          </a:xfrm>
+        </p:spPr>
+        <p:txBody>
+          <a:bodyPr>
+            <a:normAutofit/>
+          </a:bodyPr>
+          <a:lstStyle/>
+          <a:p>
+            <a:r>
+              <a:rPr lang="en-US" sz="4000" dirty="0"/>
+              <a:t>Basic Genetics</a:t>
+            </a:r>
+          </a:p>
+        </p:txBody>
+      </p:sp>
+      <p:sp>
+        <p:nvSpPr>
+          <p:cNvPr id="3" name="Subtitle 2">
+            <a:extLst>
+              <a:ext uri="{FF2B5EF4-FFF2-40B4-BE49-F238E27FC236}">
+                <a16:creationId xmlns:a16="http://schemas.microsoft.com/office/drawing/2014/main" id="{3099D270-7BD4-EA7B-E287-C6682464C6A0}"/>
+              </a:ext>
+            </a:extLst>
+          </p:cNvPr>
+          <p:cNvSpPr>
+            <a:spLocks noGrp="1"/>
+          </p:cNvSpPr>
+          <p:nvPr>
+            <p:ph type="subTitle" idx="1"/>
+          </p:nvPr>
+        </p:nvSpPr>
+        <p:spPr>
+          <a:xfrm>
+            <a:off x="7782910" y="5242675"/>
+            <a:ext cx="4330262" cy="683284"/>
+          </a:xfrm>
+        </p:spPr>
+        <p:txBody>
+          <a:bodyPr>
+            <a:normAutofit/>
+          </a:bodyPr>
+          <a:lstStyle/>
+          <a:p>
+            <a:r>
+              <a:rPr lang="en-GB" sz="2000" dirty="0"/>
+              <a:t>Introduction to basic rules of genetics</a:t>
+            </a:r>
+          </a:p>
+        </p:txBody>
+      </p:sp>
+      <p:cxnSp>
+        <p:nvCxnSpPr>
+          <p:cNvPr id="11" name="Straight Connector 10">
+            <a:extLst>
+              <a:ext uri="{FF2B5EF4-FFF2-40B4-BE49-F238E27FC236}">
+                <a16:creationId xmlns:a16="http://schemas.microsoft.com/office/drawing/2014/main" id="{BCDAEC91-5BCE-4B55-9CC0-43EF94CB734B}"/>
+              </a:ext>
+              <a:ext uri="{C183D7F6-B498-43B3-948B-1728B52AA6E4}">
+                <adec:decorative xmlns:adec="http://schemas.microsoft.com/office/drawing/2017/decorative" val="1"/>
+              </a:ext>
+            </a:extLst>
+          </p:cNvPr>
+          <p:cNvCxnSpPr>
+            <a:cxnSpLocks noGrp="1" noRot="1" noChangeAspect="1" noMove="1" noResize="1" noEditPoints="1" noAdjustHandles="1" noChangeArrowheads="1" noChangeShapeType="1"/>
+          </p:cNvCxnSpPr>
+          <p:nvPr>
+            <p:extLst>
+              <p:ext uri="{386F3935-93C4-4BCD-93E2-E3B085C9AB24}">
+                <p16:designElem xmlns:p16="http://schemas.microsoft.com/office/powerpoint/2015/main" val="1"/>
+              </p:ext>
+            </p:extLst>
+          </p:nvPr>
+        </p:nvCxnSpPr>
+        <p:spPr>
+          <a:xfrm>
+            <a:off x="9480331" y="5123793"/>
+            <a:ext cx="935420" cy="0"/>
+          </a:xfrm>
+          <a:prstGeom prst="line">
+            <a:avLst/>
+          </a:prstGeom>
+          <a:ln w="25400" cap="sq">
+            <a:solidFill>
+              <a:schemeClr val="tx1">
+                <a:lumMod val="85000"/>
+                <a:lumOff val="15000"/>
+              </a:schemeClr>
+            </a:solidFill>
+            <a:bevel/>
+          </a:ln>
+        </p:spPr>
+        <p:style>
+          <a:lnRef idx="1">
+            <a:schemeClr val="accent1"/>
+          </a:lnRef>
+          <a:fillRef idx="0">
+            <a:schemeClr val="accent1"/>
+          </a:fillRef>
+          <a:effectRef idx="0">
+            <a:schemeClr val="accent1"/>
+          </a:effectRef>
+          <a:fontRef idx="minor">
+            <a:schemeClr val="tx1"/>
+          </a:fontRef>
+        </p:style>
+      </p:cxnSp>
+    </p:spTree>
+    <p:extLst>
+      <p:ext uri="{BB962C8B-B14F-4D97-AF65-F5344CB8AC3E}">
+        <p14:creationId xmlns:p14="http://schemas.microsoft.com/office/powerpoint/2010/main" val="539649064"/>
+      </p:ext>
+    </p:extLst>
+  </p:cSld>
+  <p:clrMapOvr>
+    <a:masterClrMapping/>
+  </p:clrMapOvr>
+</p:sld>
+</file>
+
 <file path=ppt/theme/theme1.xml><?xml version="1.0" encoding="utf-8"?>
 <a:theme xmlns:a="http://schemas.openxmlformats.org/drawingml/2006/main" name="Office Theme">
   <a:themeElements>
@@ -3952,4 +4646,299 @@
     </a:ext>
   </a:extLst>
 </a:theme>
+</file>
+
+<file path=ppt/theme/theme2.xml><?xml version="1.0" encoding="utf-8"?>
+<a:theme xmlns:a="http://schemas.openxmlformats.org/drawingml/2006/main" name="Office Theme">
+  <a:themeElements>
+    <a:clrScheme name="Office">
+      <a:dk1>
+        <a:sysClr val="windowText" lastClr="000000"/>
+      </a:dk1>
+      <a:lt1>
+        <a:sysClr val="window" lastClr="FFFFFF"/>
+      </a:lt1>
+      <a:dk2>
+        <a:srgbClr val="44546A"/>
+      </a:dk2>
+      <a:lt2>
+        <a:srgbClr val="E7E6E6"/>
+      </a:lt2>
+      <a:accent1>
+        <a:srgbClr val="4472C4"/>
+      </a:accent1>
+      <a:accent2>
+        <a:srgbClr val="ED7D31"/>
+      </a:accent2>
+      <a:accent3>
+        <a:srgbClr val="A5A5A5"/>
+      </a:accent3>
+      <a:accent4>
+        <a:srgbClr val="FFC000"/>
+      </a:accent4>
+      <a:accent5>
+        <a:srgbClr val="5B9BD5"/>
+      </a:accent5>
+      <a:accent6>
+        <a:srgbClr val="70AD47"/>
+      </a:accent6>
+      <a:hlink>
+        <a:srgbClr val="0563C1"/>
+      </a:hlink>
+      <a:folHlink>
+        <a:srgbClr val="954F72"/>
+      </a:folHlink>
+    </a:clrScheme>
+    <a:fontScheme name="Office">
+      <a:majorFont>
+        <a:latin typeface="Calibri Light" panose="020F0302020204030204"/>
+        <a:ea typeface=""/>
+        <a:cs typeface=""/>
+        <a:font script="Jpan" typeface="游ゴシック Light"/>
+        <a:font script="Hang" typeface="맑은 고딕"/>
+        <a:font script="Hans" typeface="等线 Light"/>
+        <a:font script="Hant" typeface="新細明體"/>
+        <a:font script="Arab" typeface="Times New Roman"/>
+        <a:font script="Hebr" typeface="Times New Roman"/>
+        <a:font script="Thai" typeface="Angsana New"/>
+        <a:font script="Ethi" typeface="Nyala"/>
+        <a:font script="Beng" typeface="Vrinda"/>
+        <a:font script="Gujr" typeface="Shruti"/>
+        <a:font script="Khmr" typeface="MoolBoran"/>
+        <a:font script="Knda" typeface="Tunga"/>
+        <a:font script="Guru" typeface="Raavi"/>
+        <a:font script="Cans" typeface="Euphemia"/>
+        <a:font script="Cher" typeface="Plantagenet Cherokee"/>
+        <a:font script="Yiii" typeface="Microsoft Yi Baiti"/>
+        <a:font script="Tibt" typeface="Microsoft Himalaya"/>
+        <a:font script="Thaa" typeface="MV Boli"/>
+        <a:font script="Deva" typeface="Mangal"/>
+        <a:font script="Telu" typeface="Gautami"/>
+        <a:font script="Taml" typeface="Latha"/>
+        <a:font script="Syrc" typeface="Estrangelo Edessa"/>
+        <a:font script="Orya" typeface="Kalinga"/>
+        <a:font script="Mlym" typeface="Kartika"/>
+        <a:font script="Laoo" typeface="DokChampa"/>
+        <a:font script="Sinh" typeface="Iskoola Pota"/>
+        <a:font script="Mong" typeface="Mongolian Baiti"/>
+        <a:font script="Viet" typeface="Times New Roman"/>
+        <a:font script="Uigh" typeface="Microsoft Uighur"/>
+        <a:font script="Geor" typeface="Sylfaen"/>
+        <a:font script="Armn" typeface="Arial"/>
+        <a:font script="Bugi" typeface="Leelawadee UI"/>
+        <a:font script="Bopo" typeface="Microsoft JhengHei"/>
+        <a:font script="Java" typeface="Javanese Text"/>
+        <a:font script="Lisu" typeface="Segoe UI"/>
+        <a:font script="Mymr" typeface="Myanmar Text"/>
+        <a:font script="Nkoo" typeface="Ebrima"/>
+        <a:font script="Olck" typeface="Nirmala UI"/>
+        <a:font script="Osma" typeface="Ebrima"/>
+        <a:font script="Phag" typeface="Phagspa"/>
+        <a:font script="Syrn" typeface="Estrangelo Edessa"/>
+        <a:font script="Syrj" typeface="Estrangelo Edessa"/>
+        <a:font script="Syre" typeface="Estrangelo Edessa"/>
+        <a:font script="Sora" typeface="Nirmala UI"/>
+        <a:font script="Tale" typeface="Microsoft Tai Le"/>
+        <a:font script="Talu" typeface="Microsoft New Tai Lue"/>
+        <a:font script="Tfng" typeface="Ebrima"/>
+      </a:majorFont>
+      <a:minorFont>
+        <a:latin typeface="Calibri" panose="020F0502020204030204"/>
+        <a:ea typeface=""/>
+        <a:cs typeface=""/>
+        <a:font script="Jpan" typeface="游ゴシック"/>
+        <a:font script="Hang" typeface="맑은 고딕"/>
+        <a:font script="Hans" typeface="等线"/>
+        <a:font script="Hant" typeface="新細明體"/>
+        <a:font script="Arab" typeface="Arial"/>
+        <a:font script="Hebr" typeface="Arial"/>
+        <a:font script="Thai" typeface="Cordia New"/>
+        <a:font script="Ethi" typeface="Nyala"/>
+        <a:font script="Beng" typeface="Vrinda"/>
+        <a:font script="Gujr" typeface="Shruti"/>
+        <a:font script="Khmr" typeface="DaunPenh"/>
+        <a:font script="Knda" typeface="Tunga"/>
+        <a:font script="Guru" typeface="Raavi"/>
+        <a:font script="Cans" typeface="Euphemia"/>
+        <a:font script="Cher" typeface="Plantagenet Cherokee"/>
+        <a:font script="Yiii" typeface="Microsoft Yi Baiti"/>
+        <a:font script="Tibt" typeface="Microsoft Himalaya"/>
+        <a:font script="Thaa" typeface="MV Boli"/>
+        <a:font script="Deva" typeface="Mangal"/>
+        <a:font script="Telu" typeface="Gautami"/>
+        <a:font script="Taml" typeface="Latha"/>
+        <a:font script="Syrc" typeface="Estrangelo Edessa"/>
+        <a:font script="Orya" typeface="Kalinga"/>
+        <a:font script="Mlym" typeface="Kartika"/>
+        <a:font script="Laoo" typeface="DokChampa"/>
+        <a:font script="Sinh" typeface="Iskoola Pota"/>
+        <a:font script="Mong" typeface="Mongolian Baiti"/>
+        <a:font script="Viet" typeface="Arial"/>
+        <a:font script="Uigh" typeface="Microsoft Uighur"/>
+        <a:font script="Geor" typeface="Sylfaen"/>
+        <a:font script="Armn" typeface="Arial"/>
+        <a:font script="Bugi" typeface="Leelawadee UI"/>
+        <a:font script="Bopo" typeface="Microsoft JhengHei"/>
+        <a:font script="Java" typeface="Javanese Text"/>
+        <a:font script="Lisu" typeface="Segoe UI"/>
+        <a:font script="Mymr" typeface="Myanmar Text"/>
+        <a:font script="Nkoo" typeface="Ebrima"/>
+        <a:font script="Olck" typeface="Nirmala UI"/>
+        <a:font script="Osma" typeface="Ebrima"/>
+        <a:font script="Phag" typeface="Phagspa"/>
+        <a:font script="Syrn" typeface="Estrangelo Edessa"/>
+        <a:font script="Syrj" typeface="Estrangelo Edessa"/>
+        <a:font script="Syre" typeface="Estrangelo Edessa"/>
+        <a:font script="Sora" typeface="Nirmala UI"/>
+        <a:font script="Tale" typeface="Microsoft Tai Le"/>
+        <a:font script="Talu" typeface="Microsoft New Tai Lue"/>
+        <a:font script="Tfng" typeface="Ebrima"/>
+      </a:minorFont>
+    </a:fontScheme>
+    <a:fmtScheme name="Office">
+      <a:fillStyleLst>
+        <a:solidFill>
+          <a:schemeClr val="phClr"/>
+        </a:solidFill>
+        <a:gradFill rotWithShape="1">
+          <a:gsLst>
+            <a:gs pos="0">
+              <a:schemeClr val="phClr">
+                <a:lumMod val="110000"/>
+                <a:satMod val="105000"/>
+                <a:tint val="67000"/>
+              </a:schemeClr>
+            </a:gs>
+            <a:gs pos="50000">
+              <a:schemeClr val="phClr">
+                <a:lumMod val="105000"/>
+                <a:satMod val="103000"/>
+                <a:tint val="73000"/>
+              </a:schemeClr>
+            </a:gs>
+            <a:gs pos="100000">
+              <a:schemeClr val="phClr">
+                <a:lumMod val="105000"/>
+                <a:satMod val="109000"/>
+                <a:tint val="81000"/>
+              </a:schemeClr>
+            </a:gs>
+          </a:gsLst>
+          <a:lin ang="5400000" scaled="0"/>
+        </a:gradFill>
+        <a:gradFill rotWithShape="1">
+          <a:gsLst>
+            <a:gs pos="0">
+              <a:schemeClr val="phClr">
+                <a:satMod val="103000"/>
+                <a:lumMod val="102000"/>
+                <a:tint val="94000"/>
+              </a:schemeClr>
+            </a:gs>
+            <a:gs pos="50000">
+              <a:schemeClr val="phClr">
+                <a:satMod val="110000"/>
+                <a:lumMod val="100000"/>
+                <a:shade val="100000"/>
+              </a:schemeClr>
+            </a:gs>
+            <a:gs pos="100000">
+              <a:schemeClr val="phClr">
+                <a:lumMod val="99000"/>
+                <a:satMod val="120000"/>
+                <a:shade val="78000"/>
+              </a:schemeClr>
+            </a:gs>
+          </a:gsLst>
+          <a:lin ang="5400000" scaled="0"/>
+        </a:gradFill>
+      </a:fillStyleLst>
+      <a:lnStyleLst>
+        <a:ln w="6350" cap="flat" cmpd="sng" algn="ctr">
+          <a:solidFill>
+            <a:schemeClr val="phClr"/>
+          </a:solidFill>
+          <a:prstDash val="solid"/>
+          <a:miter lim="800000"/>
+        </a:ln>
+        <a:ln w="12700" cap="flat" cmpd="sng" algn="ctr">
+          <a:solidFill>
+            <a:schemeClr val="phClr"/>
+          </a:solidFill>
+          <a:prstDash val="solid"/>
+          <a:miter lim="800000"/>
+        </a:ln>
+        <a:ln w="19050" cap="flat" cmpd="sng" algn="ctr">
+          <a:solidFill>
+            <a:schemeClr val="phClr"/>
+          </a:solidFill>
+          <a:prstDash val="solid"/>
+          <a:miter lim="800000"/>
+        </a:ln>
+      </a:lnStyleLst>
+      <a:effectStyleLst>
+        <a:effectStyle>
+          <a:effectLst/>
+        </a:effectStyle>
+        <a:effectStyle>
+          <a:effectLst/>
+        </a:effectStyle>
+        <a:effectStyle>
+          <a:effectLst>
+            <a:outerShdw blurRad="57150" dist="19050" dir="5400000" algn="ctr" rotWithShape="0">
+              <a:srgbClr val="000000">
+                <a:alpha val="63000"/>
+              </a:srgbClr>
+            </a:outerShdw>
+          </a:effectLst>
+        </a:effectStyle>
+      </a:effectStyleLst>
+      <a:bgFillStyleLst>
+        <a:solidFill>
+          <a:schemeClr val="phClr"/>
+        </a:solidFill>
+        <a:solidFill>
+          <a:schemeClr val="phClr">
+            <a:tint val="95000"/>
+            <a:satMod val="170000"/>
+          </a:schemeClr>
+        </a:solidFill>
+        <a:gradFill rotWithShape="1">
+          <a:gsLst>
+            <a:gs pos="0">
+              <a:schemeClr val="phClr">
+                <a:tint val="93000"/>
+                <a:satMod val="150000"/>
+                <a:shade val="98000"/>
+                <a:lumMod val="102000"/>
+              </a:schemeClr>
+            </a:gs>
+            <a:gs pos="50000">
+              <a:schemeClr val="phClr">
+                <a:tint val="98000"/>
+                <a:satMod val="130000"/>
+                <a:shade val="90000"/>
+                <a:lumMod val="103000"/>
+              </a:schemeClr>
+            </a:gs>
+            <a:gs pos="100000">
+              <a:schemeClr val="phClr">
+                <a:shade val="63000"/>
+                <a:satMod val="120000"/>
+              </a:schemeClr>
+            </a:gs>
+          </a:gsLst>
+          <a:lin ang="5400000" scaled="0"/>
+        </a:gradFill>
+      </a:bgFillStyleLst>
+    </a:fmtScheme>
+  </a:themeElements>
+  <a:objectDefaults/>
+  <a:extraClrSchemeLst/>
+  <a:extLst>
+    <a:ext uri="{05A4C25C-085E-4340-85A3-A5531E510DB2}">
+      <thm15:themeFamily xmlns:thm15="http://schemas.microsoft.com/office/thememl/2012/main" name="Office Theme" id="{62F939B6-93AF-4DB8-9C6B-D6C7DFDC589F}" vid="{4A3C46E8-61CC-4603-A589-7422A47A8E4A}"/>
+    </a:ext>
+  </a:extLst>
+</a:theme>
 </file>
</xml_diff>

<commit_message>
basic of cells (with egg example)
</commit_message>
<xml_diff>
--- a/SolvingNimsGame.pptx
+++ b/SolvingNimsGame.pptx
@@ -5,11 +5,13 @@
     <p:sldMasterId id="2147483648" r:id="rId1"/>
   </p:sldMasterIdLst>
   <p:notesMasterIdLst>
-    <p:notesMasterId r:id="rId4"/>
+    <p:notesMasterId r:id="rId6"/>
   </p:notesMasterIdLst>
   <p:sldIdLst>
     <p:sldId id="258" r:id="rId2"/>
     <p:sldId id="259" r:id="rId3"/>
+    <p:sldId id="260" r:id="rId4"/>
+    <p:sldId id="261" r:id="rId5"/>
   </p:sldIdLst>
   <p:sldSz cx="12192000" cy="6858000"/>
   <p:notesSz cx="6858000" cy="9144000"/>
@@ -458,6 +460,180 @@
     </a:lvl9pPr>
   </p:notesStyle>
 </p:notesMaster>
+</file>
+
+<file path=ppt/notesSlides/notesSlide1.xml><?xml version="1.0" encoding="utf-8"?>
+<p:notes xmlns:a="http://schemas.openxmlformats.org/drawingml/2006/main" xmlns:r="http://schemas.openxmlformats.org/officeDocument/2006/relationships" xmlns:p="http://schemas.openxmlformats.org/presentationml/2006/main">
+  <p:cSld>
+    <p:spTree>
+      <p:nvGrpSpPr>
+        <p:cNvPr id="1" name=""/>
+        <p:cNvGrpSpPr/>
+        <p:nvPr/>
+      </p:nvGrpSpPr>
+      <p:grpSpPr>
+        <a:xfrm>
+          <a:off x="0" y="0"/>
+          <a:ext cx="0" cy="0"/>
+          <a:chOff x="0" y="0"/>
+          <a:chExt cx="0" cy="0"/>
+        </a:xfrm>
+      </p:grpSpPr>
+      <p:sp>
+        <p:nvSpPr>
+          <p:cNvPr id="2" name="Espace réservé de l'image des diapositives 1"/>
+          <p:cNvSpPr>
+            <a:spLocks noGrp="1" noRot="1" noChangeAspect="1"/>
+          </p:cNvSpPr>
+          <p:nvPr>
+            <p:ph type="sldImg"/>
+          </p:nvPr>
+        </p:nvSpPr>
+        <p:spPr/>
+      </p:sp>
+      <p:sp>
+        <p:nvSpPr>
+          <p:cNvPr id="3" name="Espace réservé des notes 2"/>
+          <p:cNvSpPr>
+            <a:spLocks noGrp="1"/>
+          </p:cNvSpPr>
+          <p:nvPr>
+            <p:ph type="body" idx="1"/>
+          </p:nvPr>
+        </p:nvSpPr>
+        <p:spPr/>
+        <p:txBody>
+          <a:bodyPr/>
+          <a:lstStyle/>
+          <a:p>
+            <a:r>
+              <a:rPr lang="fr-FR" dirty="0"/>
+              <a:t>Les éléments basiques des cellules</a:t>
+            </a:r>
+          </a:p>
+        </p:txBody>
+      </p:sp>
+      <p:sp>
+        <p:nvSpPr>
+          <p:cNvPr id="4" name="Espace réservé du numéro de diapositive 3"/>
+          <p:cNvSpPr>
+            <a:spLocks noGrp="1"/>
+          </p:cNvSpPr>
+          <p:nvPr>
+            <p:ph type="sldNum" sz="quarter" idx="5"/>
+          </p:nvPr>
+        </p:nvSpPr>
+        <p:spPr/>
+        <p:txBody>
+          <a:bodyPr/>
+          <a:lstStyle/>
+          <a:p>
+            <a:fld id="{A30E9263-1FA5-4909-8E72-BCFE817977D6}" type="slidenum">
+              <a:rPr lang="fr-FR" smtClean="0"/>
+              <a:t>3</a:t>
+            </a:fld>
+            <a:endParaRPr lang="fr-FR"/>
+          </a:p>
+        </p:txBody>
+      </p:sp>
+    </p:spTree>
+    <p:extLst>
+      <p:ext uri="{BB962C8B-B14F-4D97-AF65-F5344CB8AC3E}">
+        <p14:creationId xmlns:p14="http://schemas.microsoft.com/office/powerpoint/2010/main" val="3304640907"/>
+      </p:ext>
+    </p:extLst>
+  </p:cSld>
+  <p:clrMapOvr>
+    <a:masterClrMapping/>
+  </p:clrMapOvr>
+</p:notes>
+</file>
+
+<file path=ppt/notesSlides/notesSlide2.xml><?xml version="1.0" encoding="utf-8"?>
+<p:notes xmlns:a="http://schemas.openxmlformats.org/drawingml/2006/main" xmlns:r="http://schemas.openxmlformats.org/officeDocument/2006/relationships" xmlns:p="http://schemas.openxmlformats.org/presentationml/2006/main">
+  <p:cSld>
+    <p:spTree>
+      <p:nvGrpSpPr>
+        <p:cNvPr id="1" name=""/>
+        <p:cNvGrpSpPr/>
+        <p:nvPr/>
+      </p:nvGrpSpPr>
+      <p:grpSpPr>
+        <a:xfrm>
+          <a:off x="0" y="0"/>
+          <a:ext cx="0" cy="0"/>
+          <a:chOff x="0" y="0"/>
+          <a:chExt cx="0" cy="0"/>
+        </a:xfrm>
+      </p:grpSpPr>
+      <p:sp>
+        <p:nvSpPr>
+          <p:cNvPr id="2" name="Espace réservé de l'image des diapositives 1"/>
+          <p:cNvSpPr>
+            <a:spLocks noGrp="1" noRot="1" noChangeAspect="1"/>
+          </p:cNvSpPr>
+          <p:nvPr>
+            <p:ph type="sldImg"/>
+          </p:nvPr>
+        </p:nvSpPr>
+        <p:spPr/>
+      </p:sp>
+      <p:sp>
+        <p:nvSpPr>
+          <p:cNvPr id="3" name="Espace réservé des notes 2"/>
+          <p:cNvSpPr>
+            <a:spLocks noGrp="1"/>
+          </p:cNvSpPr>
+          <p:nvPr>
+            <p:ph type="body" idx="1"/>
+          </p:nvPr>
+        </p:nvSpPr>
+        <p:spPr/>
+        <p:txBody>
+          <a:bodyPr/>
+          <a:lstStyle/>
+          <a:p>
+            <a:r>
+              <a:rPr lang="fr-FR" dirty="0"/>
+              <a:t>Exemple connus: l’œuf</a:t>
+            </a:r>
+          </a:p>
+        </p:txBody>
+      </p:sp>
+      <p:sp>
+        <p:nvSpPr>
+          <p:cNvPr id="4" name="Espace réservé du numéro de diapositive 3"/>
+          <p:cNvSpPr>
+            <a:spLocks noGrp="1"/>
+          </p:cNvSpPr>
+          <p:nvPr>
+            <p:ph type="sldNum" sz="quarter" idx="5"/>
+          </p:nvPr>
+        </p:nvSpPr>
+        <p:spPr/>
+        <p:txBody>
+          <a:bodyPr/>
+          <a:lstStyle/>
+          <a:p>
+            <a:fld id="{A30E9263-1FA5-4909-8E72-BCFE817977D6}" type="slidenum">
+              <a:rPr lang="fr-FR" smtClean="0"/>
+              <a:t>4</a:t>
+            </a:fld>
+            <a:endParaRPr lang="fr-FR"/>
+          </a:p>
+        </p:txBody>
+      </p:sp>
+    </p:spTree>
+    <p:extLst>
+      <p:ext uri="{BB962C8B-B14F-4D97-AF65-F5344CB8AC3E}">
+        <p14:creationId xmlns:p14="http://schemas.microsoft.com/office/powerpoint/2010/main" val="555148891"/>
+      </p:ext>
+    </p:extLst>
+  </p:cSld>
+  <p:clrMapOvr>
+    <a:masterClrMapping/>
+  </p:clrMapOvr>
+</p:notes>
 </file>
 
 <file path=ppt/slideLayouts/slideLayout1.xml><?xml version="1.0" encoding="utf-8"?>
@@ -4350,6 +4526,1681 @@
   <p:clrMapOvr>
     <a:masterClrMapping/>
   </p:clrMapOvr>
+</p:sld>
+</file>
+
+<file path=ppt/slides/slide3.xml><?xml version="1.0" encoding="utf-8"?>
+<p:sld xmlns:a="http://schemas.openxmlformats.org/drawingml/2006/main" xmlns:r="http://schemas.openxmlformats.org/officeDocument/2006/relationships" xmlns:p="http://schemas.openxmlformats.org/presentationml/2006/main">
+  <p:cSld>
+    <p:spTree>
+      <p:nvGrpSpPr>
+        <p:cNvPr id="1" name=""/>
+        <p:cNvGrpSpPr/>
+        <p:nvPr/>
+      </p:nvGrpSpPr>
+      <p:grpSpPr>
+        <a:xfrm>
+          <a:off x="0" y="0"/>
+          <a:ext cx="0" cy="0"/>
+          <a:chOff x="0" y="0"/>
+          <a:chExt cx="0" cy="0"/>
+        </a:xfrm>
+      </p:grpSpPr>
+      <p:sp>
+        <p:nvSpPr>
+          <p:cNvPr id="4" name="Titre 3">
+            <a:extLst>
+              <a:ext uri="{FF2B5EF4-FFF2-40B4-BE49-F238E27FC236}">
+                <a16:creationId xmlns:a16="http://schemas.microsoft.com/office/drawing/2014/main" id="{49E736D7-67F0-41B4-90E7-92366A182D17}"/>
+              </a:ext>
+            </a:extLst>
+          </p:cNvPr>
+          <p:cNvSpPr>
+            <a:spLocks noGrp="1"/>
+          </p:cNvSpPr>
+          <p:nvPr>
+            <p:ph type="title"/>
+          </p:nvPr>
+        </p:nvSpPr>
+        <p:spPr/>
+        <p:txBody>
+          <a:bodyPr/>
+          <a:lstStyle/>
+          <a:p>
+            <a:r>
+              <a:rPr lang="en-US" b="1" dirty="0">
+                <a:solidFill>
+                  <a:srgbClr val="FF0000"/>
+                </a:solidFill>
+              </a:rPr>
+              <a:t>Cells…</a:t>
+            </a:r>
+          </a:p>
+        </p:txBody>
+      </p:sp>
+      <p:sp>
+        <p:nvSpPr>
+          <p:cNvPr id="5" name="Ellipse 4">
+            <a:extLst>
+              <a:ext uri="{FF2B5EF4-FFF2-40B4-BE49-F238E27FC236}">
+                <a16:creationId xmlns:a16="http://schemas.microsoft.com/office/drawing/2014/main" id="{97EF94BE-C150-4787-93D5-E298499FAB1D}"/>
+              </a:ext>
+            </a:extLst>
+          </p:cNvPr>
+          <p:cNvSpPr/>
+          <p:nvPr/>
+        </p:nvSpPr>
+        <p:spPr>
+          <a:xfrm>
+            <a:off x="792866" y="1736202"/>
+            <a:ext cx="6603357" cy="4681960"/>
+          </a:xfrm>
+          <a:prstGeom prst="ellipse">
+            <a:avLst/>
+          </a:prstGeom>
+          <a:noFill/>
+          <a:ln w="76200">
+            <a:solidFill>
+              <a:schemeClr val="tx1">
+                <a:lumMod val="50000"/>
+                <a:lumOff val="50000"/>
+              </a:schemeClr>
+            </a:solidFill>
+          </a:ln>
+        </p:spPr>
+        <p:style>
+          <a:lnRef idx="2">
+            <a:schemeClr val="accent1">
+              <a:shade val="50000"/>
+            </a:schemeClr>
+          </a:lnRef>
+          <a:fillRef idx="1">
+            <a:schemeClr val="accent1"/>
+          </a:fillRef>
+          <a:effectRef idx="0">
+            <a:schemeClr val="accent1"/>
+          </a:effectRef>
+          <a:fontRef idx="minor">
+            <a:schemeClr val="lt1"/>
+          </a:fontRef>
+        </p:style>
+        <p:txBody>
+          <a:bodyPr rtlCol="0" anchor="ctr"/>
+          <a:lstStyle/>
+          <a:p>
+            <a:pPr algn="ctr"/>
+            <a:endParaRPr lang="fr-FR"/>
+          </a:p>
+        </p:txBody>
+      </p:sp>
+      <p:sp>
+        <p:nvSpPr>
+          <p:cNvPr id="6" name="Ellipse 5">
+            <a:extLst>
+              <a:ext uri="{FF2B5EF4-FFF2-40B4-BE49-F238E27FC236}">
+                <a16:creationId xmlns:a16="http://schemas.microsoft.com/office/drawing/2014/main" id="{3B2E61C6-8B32-4495-AC5F-A9E5C408E673}"/>
+              </a:ext>
+            </a:extLst>
+          </p:cNvPr>
+          <p:cNvSpPr/>
+          <p:nvPr/>
+        </p:nvSpPr>
+        <p:spPr>
+          <a:xfrm>
+            <a:off x="3310360" y="2078620"/>
+            <a:ext cx="2835798" cy="2700760"/>
+          </a:xfrm>
+          <a:prstGeom prst="ellipse">
+            <a:avLst/>
+          </a:prstGeom>
+          <a:solidFill>
+            <a:schemeClr val="bg1">
+              <a:lumMod val="95000"/>
+            </a:schemeClr>
+          </a:solidFill>
+          <a:ln w="19050">
+            <a:solidFill>
+              <a:schemeClr val="tx1"/>
+            </a:solidFill>
+          </a:ln>
+        </p:spPr>
+        <p:style>
+          <a:lnRef idx="2">
+            <a:schemeClr val="accent1">
+              <a:shade val="50000"/>
+            </a:schemeClr>
+          </a:lnRef>
+          <a:fillRef idx="1">
+            <a:schemeClr val="accent1"/>
+          </a:fillRef>
+          <a:effectRef idx="0">
+            <a:schemeClr val="accent1"/>
+          </a:effectRef>
+          <a:fontRef idx="minor">
+            <a:schemeClr val="lt1"/>
+          </a:fontRef>
+        </p:style>
+        <p:txBody>
+          <a:bodyPr rtlCol="0" anchor="ctr"/>
+          <a:lstStyle/>
+          <a:p>
+            <a:pPr algn="ctr"/>
+            <a:endParaRPr lang="fr-FR"/>
+          </a:p>
+        </p:txBody>
+      </p:sp>
+      <p:cxnSp>
+        <p:nvCxnSpPr>
+          <p:cNvPr id="3" name="Connecteur droit avec flèche 2">
+            <a:extLst>
+              <a:ext uri="{FF2B5EF4-FFF2-40B4-BE49-F238E27FC236}">
+                <a16:creationId xmlns:a16="http://schemas.microsoft.com/office/drawing/2014/main" id="{4A054C9B-83D2-4028-85B2-EA96ADD58AF5}"/>
+              </a:ext>
+            </a:extLst>
+          </p:cNvPr>
+          <p:cNvCxnSpPr>
+            <a:cxnSpLocks/>
+            <a:stCxn id="6" idx="7"/>
+            <a:endCxn id="15" idx="1"/>
+          </p:cNvCxnSpPr>
+          <p:nvPr/>
+        </p:nvCxnSpPr>
+        <p:spPr>
+          <a:xfrm flipV="1">
+            <a:off x="5730865" y="1690688"/>
+            <a:ext cx="2785379" cy="783449"/>
+          </a:xfrm>
+          <a:prstGeom prst="straightConnector1">
+            <a:avLst/>
+          </a:prstGeom>
+          <a:ln w="38100">
+            <a:solidFill>
+              <a:srgbClr val="0070C0"/>
+            </a:solidFill>
+            <a:headEnd type="arrow"/>
+            <a:tailEnd type="none"/>
+          </a:ln>
+        </p:spPr>
+        <p:style>
+          <a:lnRef idx="1">
+            <a:schemeClr val="accent1"/>
+          </a:lnRef>
+          <a:fillRef idx="0">
+            <a:schemeClr val="accent1"/>
+          </a:fillRef>
+          <a:effectRef idx="0">
+            <a:schemeClr val="accent1"/>
+          </a:effectRef>
+          <a:fontRef idx="minor">
+            <a:schemeClr val="tx1"/>
+          </a:fontRef>
+        </p:style>
+      </p:cxnSp>
+      <p:cxnSp>
+        <p:nvCxnSpPr>
+          <p:cNvPr id="7" name="Connecteur droit avec flèche 6">
+            <a:extLst>
+              <a:ext uri="{FF2B5EF4-FFF2-40B4-BE49-F238E27FC236}">
+                <a16:creationId xmlns:a16="http://schemas.microsoft.com/office/drawing/2014/main" id="{C9714FA6-258E-41D9-A3ED-94C1B8DA34AD}"/>
+              </a:ext>
+            </a:extLst>
+          </p:cNvPr>
+          <p:cNvCxnSpPr>
+            <a:cxnSpLocks/>
+            <a:endCxn id="17" idx="1"/>
+          </p:cNvCxnSpPr>
+          <p:nvPr/>
+        </p:nvCxnSpPr>
+        <p:spPr>
+          <a:xfrm flipV="1">
+            <a:off x="6632294" y="2843309"/>
+            <a:ext cx="1875098" cy="374454"/>
+          </a:xfrm>
+          <a:prstGeom prst="straightConnector1">
+            <a:avLst/>
+          </a:prstGeom>
+          <a:ln w="38100">
+            <a:solidFill>
+              <a:srgbClr val="0070C0"/>
+            </a:solidFill>
+            <a:headEnd type="arrow"/>
+            <a:tailEnd type="none"/>
+          </a:ln>
+        </p:spPr>
+        <p:style>
+          <a:lnRef idx="1">
+            <a:schemeClr val="accent1"/>
+          </a:lnRef>
+          <a:fillRef idx="0">
+            <a:schemeClr val="accent1"/>
+          </a:fillRef>
+          <a:effectRef idx="0">
+            <a:schemeClr val="accent1"/>
+          </a:effectRef>
+          <a:fontRef idx="minor">
+            <a:schemeClr val="tx1"/>
+          </a:fontRef>
+        </p:style>
+      </p:cxnSp>
+      <p:cxnSp>
+        <p:nvCxnSpPr>
+          <p:cNvPr id="8" name="Connecteur droit avec flèche 7">
+            <a:extLst>
+              <a:ext uri="{FF2B5EF4-FFF2-40B4-BE49-F238E27FC236}">
+                <a16:creationId xmlns:a16="http://schemas.microsoft.com/office/drawing/2014/main" id="{27868C80-A922-4F3A-AB6C-E6DBEF5807E6}"/>
+              </a:ext>
+            </a:extLst>
+          </p:cNvPr>
+          <p:cNvCxnSpPr>
+            <a:cxnSpLocks/>
+            <a:stCxn id="5" idx="6"/>
+            <a:endCxn id="18" idx="1"/>
+          </p:cNvCxnSpPr>
+          <p:nvPr/>
+        </p:nvCxnSpPr>
+        <p:spPr>
+          <a:xfrm>
+            <a:off x="7396223" y="4077182"/>
+            <a:ext cx="1007339" cy="96798"/>
+          </a:xfrm>
+          <a:prstGeom prst="straightConnector1">
+            <a:avLst/>
+          </a:prstGeom>
+          <a:ln w="38100">
+            <a:solidFill>
+              <a:srgbClr val="0070C0"/>
+            </a:solidFill>
+            <a:headEnd type="arrow"/>
+            <a:tailEnd type="none"/>
+          </a:ln>
+        </p:spPr>
+        <p:style>
+          <a:lnRef idx="1">
+            <a:schemeClr val="accent1"/>
+          </a:lnRef>
+          <a:fillRef idx="0">
+            <a:schemeClr val="accent1"/>
+          </a:fillRef>
+          <a:effectRef idx="0">
+            <a:schemeClr val="accent1"/>
+          </a:effectRef>
+          <a:fontRef idx="minor">
+            <a:schemeClr val="tx1"/>
+          </a:fontRef>
+        </p:style>
+      </p:cxnSp>
+      <p:sp>
+        <p:nvSpPr>
+          <p:cNvPr id="15" name="ZoneTexte 14">
+            <a:extLst>
+              <a:ext uri="{FF2B5EF4-FFF2-40B4-BE49-F238E27FC236}">
+                <a16:creationId xmlns:a16="http://schemas.microsoft.com/office/drawing/2014/main" id="{B7077634-9536-497C-9C4C-799A0095437A}"/>
+              </a:ext>
+            </a:extLst>
+          </p:cNvPr>
+          <p:cNvSpPr txBox="1"/>
+          <p:nvPr/>
+        </p:nvSpPr>
+        <p:spPr>
+          <a:xfrm>
+            <a:off x="8516244" y="1429078"/>
+            <a:ext cx="1115947" cy="523220"/>
+          </a:xfrm>
+          <a:prstGeom prst="rect">
+            <a:avLst/>
+          </a:prstGeom>
+          <a:noFill/>
+        </p:spPr>
+        <p:txBody>
+          <a:bodyPr wrap="none" rtlCol="0">
+            <a:spAutoFit/>
+          </a:bodyPr>
+          <a:lstStyle/>
+          <a:p>
+            <a:r>
+              <a:rPr lang="en-US" sz="2800" dirty="0">
+                <a:solidFill>
+                  <a:srgbClr val="0070C0"/>
+                </a:solidFill>
+              </a:rPr>
+              <a:t>Kernel</a:t>
+            </a:r>
+          </a:p>
+        </p:txBody>
+      </p:sp>
+      <p:sp>
+        <p:nvSpPr>
+          <p:cNvPr id="17" name="ZoneTexte 16">
+            <a:extLst>
+              <a:ext uri="{FF2B5EF4-FFF2-40B4-BE49-F238E27FC236}">
+                <a16:creationId xmlns:a16="http://schemas.microsoft.com/office/drawing/2014/main" id="{8A77C8B5-74DE-4C03-9DD7-35C1B91C5F94}"/>
+              </a:ext>
+            </a:extLst>
+          </p:cNvPr>
+          <p:cNvSpPr txBox="1"/>
+          <p:nvPr/>
+        </p:nvSpPr>
+        <p:spPr>
+          <a:xfrm>
+            <a:off x="8507392" y="2581699"/>
+            <a:ext cx="1715341" cy="523220"/>
+          </a:xfrm>
+          <a:prstGeom prst="rect">
+            <a:avLst/>
+          </a:prstGeom>
+          <a:noFill/>
+        </p:spPr>
+        <p:txBody>
+          <a:bodyPr wrap="none" rtlCol="0">
+            <a:spAutoFit/>
+          </a:bodyPr>
+          <a:lstStyle/>
+          <a:p>
+            <a:r>
+              <a:rPr lang="en-US" sz="2800" dirty="0">
+                <a:solidFill>
+                  <a:srgbClr val="0070C0"/>
+                </a:solidFill>
+              </a:rPr>
+              <a:t>Cytoplasm</a:t>
+            </a:r>
+          </a:p>
+        </p:txBody>
+      </p:sp>
+      <p:sp>
+        <p:nvSpPr>
+          <p:cNvPr id="18" name="ZoneTexte 17">
+            <a:extLst>
+              <a:ext uri="{FF2B5EF4-FFF2-40B4-BE49-F238E27FC236}">
+                <a16:creationId xmlns:a16="http://schemas.microsoft.com/office/drawing/2014/main" id="{A88A297E-204E-4B65-85DD-4E682EA65D2F}"/>
+              </a:ext>
+            </a:extLst>
+          </p:cNvPr>
+          <p:cNvSpPr txBox="1"/>
+          <p:nvPr/>
+        </p:nvSpPr>
+        <p:spPr>
+          <a:xfrm>
+            <a:off x="8403562" y="3912370"/>
+            <a:ext cx="1802738" cy="523220"/>
+          </a:xfrm>
+          <a:prstGeom prst="rect">
+            <a:avLst/>
+          </a:prstGeom>
+          <a:noFill/>
+        </p:spPr>
+        <p:txBody>
+          <a:bodyPr wrap="none" rtlCol="0">
+            <a:spAutoFit/>
+          </a:bodyPr>
+          <a:lstStyle/>
+          <a:p>
+            <a:r>
+              <a:rPr lang="en-US" sz="2800" dirty="0">
+                <a:solidFill>
+                  <a:srgbClr val="0070C0"/>
+                </a:solidFill>
+              </a:rPr>
+              <a:t>Membrane</a:t>
+            </a:r>
+          </a:p>
+        </p:txBody>
+      </p:sp>
+    </p:spTree>
+    <p:extLst>
+      <p:ext uri="{BB962C8B-B14F-4D97-AF65-F5344CB8AC3E}">
+        <p14:creationId xmlns:p14="http://schemas.microsoft.com/office/powerpoint/2010/main" val="3017051549"/>
+      </p:ext>
+    </p:extLst>
+  </p:cSld>
+  <p:clrMapOvr>
+    <a:masterClrMapping/>
+  </p:clrMapOvr>
+  <p:timing>
+    <p:tnLst>
+      <p:par>
+        <p:cTn id="1" dur="indefinite" restart="never" nodeType="tmRoot">
+          <p:childTnLst>
+            <p:seq concurrent="1" nextAc="seek">
+              <p:cTn id="2" dur="indefinite" nodeType="mainSeq">
+                <p:childTnLst>
+                  <p:par>
+                    <p:cTn id="3" fill="hold">
+                      <p:stCondLst>
+                        <p:cond delay="indefinite"/>
+                      </p:stCondLst>
+                      <p:childTnLst>
+                        <p:par>
+                          <p:cTn id="4" fill="hold">
+                            <p:stCondLst>
+                              <p:cond delay="0"/>
+                            </p:stCondLst>
+                            <p:childTnLst>
+                              <p:par>
+                                <p:cTn id="5" presetID="10" presetClass="entr" presetSubtype="0" fill="hold" nodeType="clickEffect">
+                                  <p:stCondLst>
+                                    <p:cond delay="0"/>
+                                  </p:stCondLst>
+                                  <p:childTnLst>
+                                    <p:set>
+                                      <p:cBhvr>
+                                        <p:cTn id="6" dur="1" fill="hold">
+                                          <p:stCondLst>
+                                            <p:cond delay="0"/>
+                                          </p:stCondLst>
+                                        </p:cTn>
+                                        <p:tgtEl>
+                                          <p:spTgt spid="3"/>
+                                        </p:tgtEl>
+                                        <p:attrNameLst>
+                                          <p:attrName>style.visibility</p:attrName>
+                                        </p:attrNameLst>
+                                      </p:cBhvr>
+                                      <p:to>
+                                        <p:strVal val="visible"/>
+                                      </p:to>
+                                    </p:set>
+                                    <p:animEffect transition="in" filter="fade">
+                                      <p:cBhvr>
+                                        <p:cTn id="7" dur="500"/>
+                                        <p:tgtEl>
+                                          <p:spTgt spid="3"/>
+                                        </p:tgtEl>
+                                      </p:cBhvr>
+                                    </p:animEffect>
+                                  </p:childTnLst>
+                                </p:cTn>
+                              </p:par>
+                              <p:par>
+                                <p:cTn id="8" presetID="10" presetClass="entr" presetSubtype="0" fill="hold" grpId="0" nodeType="withEffect">
+                                  <p:stCondLst>
+                                    <p:cond delay="0"/>
+                                  </p:stCondLst>
+                                  <p:childTnLst>
+                                    <p:set>
+                                      <p:cBhvr>
+                                        <p:cTn id="9" dur="1" fill="hold">
+                                          <p:stCondLst>
+                                            <p:cond delay="0"/>
+                                          </p:stCondLst>
+                                        </p:cTn>
+                                        <p:tgtEl>
+                                          <p:spTgt spid="15"/>
+                                        </p:tgtEl>
+                                        <p:attrNameLst>
+                                          <p:attrName>style.visibility</p:attrName>
+                                        </p:attrNameLst>
+                                      </p:cBhvr>
+                                      <p:to>
+                                        <p:strVal val="visible"/>
+                                      </p:to>
+                                    </p:set>
+                                    <p:animEffect transition="in" filter="fade">
+                                      <p:cBhvr>
+                                        <p:cTn id="10" dur="500"/>
+                                        <p:tgtEl>
+                                          <p:spTgt spid="15"/>
+                                        </p:tgtEl>
+                                      </p:cBhvr>
+                                    </p:animEffect>
+                                  </p:childTnLst>
+                                </p:cTn>
+                              </p:par>
+                            </p:childTnLst>
+                          </p:cTn>
+                        </p:par>
+                      </p:childTnLst>
+                    </p:cTn>
+                  </p:par>
+                  <p:par>
+                    <p:cTn id="11" fill="hold">
+                      <p:stCondLst>
+                        <p:cond delay="indefinite"/>
+                      </p:stCondLst>
+                      <p:childTnLst>
+                        <p:par>
+                          <p:cTn id="12" fill="hold">
+                            <p:stCondLst>
+                              <p:cond delay="0"/>
+                            </p:stCondLst>
+                            <p:childTnLst>
+                              <p:par>
+                                <p:cTn id="13" presetID="10" presetClass="entr" presetSubtype="0" fill="hold" nodeType="clickEffect">
+                                  <p:stCondLst>
+                                    <p:cond delay="0"/>
+                                  </p:stCondLst>
+                                  <p:childTnLst>
+                                    <p:set>
+                                      <p:cBhvr>
+                                        <p:cTn id="14" dur="1" fill="hold">
+                                          <p:stCondLst>
+                                            <p:cond delay="0"/>
+                                          </p:stCondLst>
+                                        </p:cTn>
+                                        <p:tgtEl>
+                                          <p:spTgt spid="7"/>
+                                        </p:tgtEl>
+                                        <p:attrNameLst>
+                                          <p:attrName>style.visibility</p:attrName>
+                                        </p:attrNameLst>
+                                      </p:cBhvr>
+                                      <p:to>
+                                        <p:strVal val="visible"/>
+                                      </p:to>
+                                    </p:set>
+                                    <p:animEffect transition="in" filter="fade">
+                                      <p:cBhvr>
+                                        <p:cTn id="15" dur="500"/>
+                                        <p:tgtEl>
+                                          <p:spTgt spid="7"/>
+                                        </p:tgtEl>
+                                      </p:cBhvr>
+                                    </p:animEffect>
+                                  </p:childTnLst>
+                                </p:cTn>
+                              </p:par>
+                              <p:par>
+                                <p:cTn id="16" presetID="10" presetClass="entr" presetSubtype="0" fill="hold" grpId="0" nodeType="withEffect">
+                                  <p:stCondLst>
+                                    <p:cond delay="0"/>
+                                  </p:stCondLst>
+                                  <p:childTnLst>
+                                    <p:set>
+                                      <p:cBhvr>
+                                        <p:cTn id="17" dur="1" fill="hold">
+                                          <p:stCondLst>
+                                            <p:cond delay="0"/>
+                                          </p:stCondLst>
+                                        </p:cTn>
+                                        <p:tgtEl>
+                                          <p:spTgt spid="17"/>
+                                        </p:tgtEl>
+                                        <p:attrNameLst>
+                                          <p:attrName>style.visibility</p:attrName>
+                                        </p:attrNameLst>
+                                      </p:cBhvr>
+                                      <p:to>
+                                        <p:strVal val="visible"/>
+                                      </p:to>
+                                    </p:set>
+                                    <p:animEffect transition="in" filter="fade">
+                                      <p:cBhvr>
+                                        <p:cTn id="18" dur="500"/>
+                                        <p:tgtEl>
+                                          <p:spTgt spid="17"/>
+                                        </p:tgtEl>
+                                      </p:cBhvr>
+                                    </p:animEffect>
+                                  </p:childTnLst>
+                                </p:cTn>
+                              </p:par>
+                            </p:childTnLst>
+                          </p:cTn>
+                        </p:par>
+                      </p:childTnLst>
+                    </p:cTn>
+                  </p:par>
+                  <p:par>
+                    <p:cTn id="19" fill="hold">
+                      <p:stCondLst>
+                        <p:cond delay="indefinite"/>
+                      </p:stCondLst>
+                      <p:childTnLst>
+                        <p:par>
+                          <p:cTn id="20" fill="hold">
+                            <p:stCondLst>
+                              <p:cond delay="0"/>
+                            </p:stCondLst>
+                            <p:childTnLst>
+                              <p:par>
+                                <p:cTn id="21" presetID="10" presetClass="entr" presetSubtype="0" fill="hold" nodeType="clickEffect">
+                                  <p:stCondLst>
+                                    <p:cond delay="0"/>
+                                  </p:stCondLst>
+                                  <p:childTnLst>
+                                    <p:set>
+                                      <p:cBhvr>
+                                        <p:cTn id="22" dur="1" fill="hold">
+                                          <p:stCondLst>
+                                            <p:cond delay="0"/>
+                                          </p:stCondLst>
+                                        </p:cTn>
+                                        <p:tgtEl>
+                                          <p:spTgt spid="8"/>
+                                        </p:tgtEl>
+                                        <p:attrNameLst>
+                                          <p:attrName>style.visibility</p:attrName>
+                                        </p:attrNameLst>
+                                      </p:cBhvr>
+                                      <p:to>
+                                        <p:strVal val="visible"/>
+                                      </p:to>
+                                    </p:set>
+                                    <p:animEffect transition="in" filter="fade">
+                                      <p:cBhvr>
+                                        <p:cTn id="23" dur="500"/>
+                                        <p:tgtEl>
+                                          <p:spTgt spid="8"/>
+                                        </p:tgtEl>
+                                      </p:cBhvr>
+                                    </p:animEffect>
+                                  </p:childTnLst>
+                                </p:cTn>
+                              </p:par>
+                              <p:par>
+                                <p:cTn id="24" presetID="10" presetClass="entr" presetSubtype="0" fill="hold" grpId="0" nodeType="withEffect">
+                                  <p:stCondLst>
+                                    <p:cond delay="0"/>
+                                  </p:stCondLst>
+                                  <p:childTnLst>
+                                    <p:set>
+                                      <p:cBhvr>
+                                        <p:cTn id="25" dur="1" fill="hold">
+                                          <p:stCondLst>
+                                            <p:cond delay="0"/>
+                                          </p:stCondLst>
+                                        </p:cTn>
+                                        <p:tgtEl>
+                                          <p:spTgt spid="18"/>
+                                        </p:tgtEl>
+                                        <p:attrNameLst>
+                                          <p:attrName>style.visibility</p:attrName>
+                                        </p:attrNameLst>
+                                      </p:cBhvr>
+                                      <p:to>
+                                        <p:strVal val="visible"/>
+                                      </p:to>
+                                    </p:set>
+                                    <p:animEffect transition="in" filter="fade">
+                                      <p:cBhvr>
+                                        <p:cTn id="26" dur="500"/>
+                                        <p:tgtEl>
+                                          <p:spTgt spid="18"/>
+                                        </p:tgtEl>
+                                      </p:cBhvr>
+                                    </p:animEffect>
+                                  </p:childTnLst>
+                                </p:cTn>
+                              </p:par>
+                            </p:childTnLst>
+                          </p:cTn>
+                        </p:par>
+                      </p:childTnLst>
+                    </p:cTn>
+                  </p:par>
+                </p:childTnLst>
+              </p:cTn>
+              <p:prevCondLst>
+                <p:cond evt="onPrev" delay="0">
+                  <p:tgtEl>
+                    <p:sldTgt/>
+                  </p:tgtEl>
+                </p:cond>
+              </p:prevCondLst>
+              <p:nextCondLst>
+                <p:cond evt="onNext" delay="0">
+                  <p:tgtEl>
+                    <p:sldTgt/>
+                  </p:tgtEl>
+                </p:cond>
+              </p:nextCondLst>
+            </p:seq>
+          </p:childTnLst>
+        </p:cTn>
+      </p:par>
+    </p:tnLst>
+    <p:bldLst>
+      <p:bldP spid="15" grpId="0"/>
+      <p:bldP spid="17" grpId="0"/>
+      <p:bldP spid="18" grpId="0"/>
+    </p:bldLst>
+  </p:timing>
+</p:sld>
+</file>
+
+<file path=ppt/slides/slide4.xml><?xml version="1.0" encoding="utf-8"?>
+<p:sld xmlns:a="http://schemas.openxmlformats.org/drawingml/2006/main" xmlns:r="http://schemas.openxmlformats.org/officeDocument/2006/relationships" xmlns:p="http://schemas.openxmlformats.org/presentationml/2006/main">
+  <p:cSld>
+    <p:spTree>
+      <p:nvGrpSpPr>
+        <p:cNvPr id="1" name=""/>
+        <p:cNvGrpSpPr/>
+        <p:nvPr/>
+      </p:nvGrpSpPr>
+      <p:grpSpPr>
+        <a:xfrm>
+          <a:off x="0" y="0"/>
+          <a:ext cx="0" cy="0"/>
+          <a:chOff x="0" y="0"/>
+          <a:chExt cx="0" cy="0"/>
+        </a:xfrm>
+      </p:grpSpPr>
+      <p:pic>
+        <p:nvPicPr>
+          <p:cNvPr id="9" name="Image 8" descr="œuf&#10;">
+            <a:extLst>
+              <a:ext uri="{FF2B5EF4-FFF2-40B4-BE49-F238E27FC236}">
+                <a16:creationId xmlns:a16="http://schemas.microsoft.com/office/drawing/2014/main" id="{A65BDCDE-DE02-4763-B6EA-2AC117B37A26}"/>
+              </a:ext>
+            </a:extLst>
+          </p:cNvPr>
+          <p:cNvPicPr>
+            <a:picLocks noChangeAspect="1"/>
+          </p:cNvPicPr>
+          <p:nvPr/>
+        </p:nvPicPr>
+        <p:blipFill>
+          <a:blip r:embed="rId3">
+            <a:extLst>
+              <a:ext uri="{28A0092B-C50C-407E-A947-70E740481C1C}">
+                <a14:useLocalDpi xmlns:a14="http://schemas.microsoft.com/office/drawing/2010/main" val="0"/>
+              </a:ext>
+            </a:extLst>
+          </a:blip>
+          <a:stretch>
+            <a:fillRect/>
+          </a:stretch>
+        </p:blipFill>
+        <p:spPr>
+          <a:xfrm>
+            <a:off x="457609" y="1679865"/>
+            <a:ext cx="7472367" cy="4988229"/>
+          </a:xfrm>
+          <a:prstGeom prst="rect">
+            <a:avLst/>
+          </a:prstGeom>
+        </p:spPr>
+      </p:pic>
+      <p:sp>
+        <p:nvSpPr>
+          <p:cNvPr id="4" name="Titre 3">
+            <a:extLst>
+              <a:ext uri="{FF2B5EF4-FFF2-40B4-BE49-F238E27FC236}">
+                <a16:creationId xmlns:a16="http://schemas.microsoft.com/office/drawing/2014/main" id="{49E736D7-67F0-41B4-90E7-92366A182D17}"/>
+              </a:ext>
+            </a:extLst>
+          </p:cNvPr>
+          <p:cNvSpPr>
+            <a:spLocks noGrp="1"/>
+          </p:cNvSpPr>
+          <p:nvPr>
+            <p:ph type="title"/>
+          </p:nvPr>
+        </p:nvSpPr>
+        <p:spPr/>
+        <p:txBody>
+          <a:bodyPr/>
+          <a:lstStyle/>
+          <a:p>
+            <a:r>
+              <a:rPr lang="fr-FR" b="1" dirty="0">
+                <a:solidFill>
+                  <a:srgbClr val="FF0000"/>
+                </a:solidFill>
+              </a:rPr>
+              <a:t>…</a:t>
+            </a:r>
+            <a:r>
+              <a:rPr lang="fr-FR" b="1" dirty="0" err="1">
+                <a:solidFill>
+                  <a:srgbClr val="FF0000"/>
+                </a:solidFill>
+              </a:rPr>
+              <a:t>you</a:t>
+            </a:r>
+            <a:r>
+              <a:rPr lang="fr-FR" b="1" dirty="0">
+                <a:solidFill>
+                  <a:srgbClr val="FF0000"/>
+                </a:solidFill>
+              </a:rPr>
+              <a:t> </a:t>
+            </a:r>
+            <a:r>
+              <a:rPr lang="fr-FR" b="1" dirty="0" err="1">
+                <a:solidFill>
+                  <a:srgbClr val="FF0000"/>
+                </a:solidFill>
+              </a:rPr>
+              <a:t>already</a:t>
+            </a:r>
+            <a:r>
+              <a:rPr lang="fr-FR" b="1" dirty="0">
+                <a:solidFill>
+                  <a:srgbClr val="FF0000"/>
+                </a:solidFill>
+              </a:rPr>
+              <a:t> know</a:t>
+            </a:r>
+          </a:p>
+        </p:txBody>
+      </p:sp>
+      <p:sp>
+        <p:nvSpPr>
+          <p:cNvPr id="5" name="Ellipse 4">
+            <a:extLst>
+              <a:ext uri="{FF2B5EF4-FFF2-40B4-BE49-F238E27FC236}">
+                <a16:creationId xmlns:a16="http://schemas.microsoft.com/office/drawing/2014/main" id="{97EF94BE-C150-4787-93D5-E298499FAB1D}"/>
+              </a:ext>
+            </a:extLst>
+          </p:cNvPr>
+          <p:cNvSpPr/>
+          <p:nvPr/>
+        </p:nvSpPr>
+        <p:spPr>
+          <a:xfrm>
+            <a:off x="2112379" y="1614669"/>
+            <a:ext cx="4601127" cy="3374020"/>
+          </a:xfrm>
+          <a:prstGeom prst="ellipse">
+            <a:avLst/>
+          </a:prstGeom>
+          <a:noFill/>
+          <a:ln w="76200">
+            <a:solidFill>
+              <a:schemeClr val="tx1">
+                <a:lumMod val="50000"/>
+                <a:lumOff val="50000"/>
+              </a:schemeClr>
+            </a:solidFill>
+          </a:ln>
+        </p:spPr>
+        <p:style>
+          <a:lnRef idx="2">
+            <a:schemeClr val="accent1">
+              <a:shade val="50000"/>
+            </a:schemeClr>
+          </a:lnRef>
+          <a:fillRef idx="1">
+            <a:schemeClr val="accent1"/>
+          </a:fillRef>
+          <a:effectRef idx="0">
+            <a:schemeClr val="accent1"/>
+          </a:effectRef>
+          <a:fontRef idx="minor">
+            <a:schemeClr val="lt1"/>
+          </a:fontRef>
+        </p:style>
+        <p:txBody>
+          <a:bodyPr rtlCol="0" anchor="ctr"/>
+          <a:lstStyle/>
+          <a:p>
+            <a:pPr algn="ctr"/>
+            <a:endParaRPr lang="fr-FR"/>
+          </a:p>
+        </p:txBody>
+      </p:sp>
+      <p:sp>
+        <p:nvSpPr>
+          <p:cNvPr id="6" name="Ellipse 5">
+            <a:extLst>
+              <a:ext uri="{FF2B5EF4-FFF2-40B4-BE49-F238E27FC236}">
+                <a16:creationId xmlns:a16="http://schemas.microsoft.com/office/drawing/2014/main" id="{3B2E61C6-8B32-4495-AC5F-A9E5C408E673}"/>
+              </a:ext>
+            </a:extLst>
+          </p:cNvPr>
+          <p:cNvSpPr/>
+          <p:nvPr/>
+        </p:nvSpPr>
+        <p:spPr>
+          <a:xfrm>
+            <a:off x="2181827" y="3981690"/>
+            <a:ext cx="2841585" cy="1533647"/>
+          </a:xfrm>
+          <a:prstGeom prst="ellipse">
+            <a:avLst/>
+          </a:prstGeom>
+          <a:solidFill>
+            <a:schemeClr val="bg1">
+              <a:lumMod val="75000"/>
+              <a:alpha val="60000"/>
+            </a:schemeClr>
+          </a:solidFill>
+          <a:ln w="19050">
+            <a:solidFill>
+              <a:schemeClr val="tx1"/>
+            </a:solidFill>
+          </a:ln>
+        </p:spPr>
+        <p:style>
+          <a:lnRef idx="2">
+            <a:schemeClr val="accent1">
+              <a:shade val="50000"/>
+            </a:schemeClr>
+          </a:lnRef>
+          <a:fillRef idx="1">
+            <a:schemeClr val="accent1"/>
+          </a:fillRef>
+          <a:effectRef idx="0">
+            <a:schemeClr val="accent1"/>
+          </a:effectRef>
+          <a:fontRef idx="minor">
+            <a:schemeClr val="lt1"/>
+          </a:fontRef>
+        </p:style>
+        <p:txBody>
+          <a:bodyPr rtlCol="0" anchor="ctr"/>
+          <a:lstStyle/>
+          <a:p>
+            <a:pPr algn="ctr"/>
+            <a:endParaRPr lang="fr-FR"/>
+          </a:p>
+        </p:txBody>
+      </p:sp>
+      <p:cxnSp>
+        <p:nvCxnSpPr>
+          <p:cNvPr id="3" name="Connecteur droit avec flèche 2">
+            <a:extLst>
+              <a:ext uri="{FF2B5EF4-FFF2-40B4-BE49-F238E27FC236}">
+                <a16:creationId xmlns:a16="http://schemas.microsoft.com/office/drawing/2014/main" id="{4A054C9B-83D2-4028-85B2-EA96ADD58AF5}"/>
+              </a:ext>
+            </a:extLst>
+          </p:cNvPr>
+          <p:cNvCxnSpPr>
+            <a:cxnSpLocks/>
+            <a:stCxn id="6" idx="7"/>
+            <a:endCxn id="15" idx="1"/>
+          </p:cNvCxnSpPr>
+          <p:nvPr/>
+        </p:nvCxnSpPr>
+        <p:spPr>
+          <a:xfrm flipV="1">
+            <a:off x="4607272" y="1690688"/>
+            <a:ext cx="3908972" cy="2515599"/>
+          </a:xfrm>
+          <a:prstGeom prst="straightConnector1">
+            <a:avLst/>
+          </a:prstGeom>
+          <a:ln w="38100">
+            <a:solidFill>
+              <a:srgbClr val="0070C0"/>
+            </a:solidFill>
+            <a:headEnd type="arrow"/>
+            <a:tailEnd type="none"/>
+          </a:ln>
+        </p:spPr>
+        <p:style>
+          <a:lnRef idx="1">
+            <a:schemeClr val="accent1"/>
+          </a:lnRef>
+          <a:fillRef idx="0">
+            <a:schemeClr val="accent1"/>
+          </a:fillRef>
+          <a:effectRef idx="0">
+            <a:schemeClr val="accent1"/>
+          </a:effectRef>
+          <a:fontRef idx="minor">
+            <a:schemeClr val="tx1"/>
+          </a:fontRef>
+        </p:style>
+      </p:cxnSp>
+      <p:cxnSp>
+        <p:nvCxnSpPr>
+          <p:cNvPr id="8" name="Connecteur droit avec flèche 7">
+            <a:extLst>
+              <a:ext uri="{FF2B5EF4-FFF2-40B4-BE49-F238E27FC236}">
+                <a16:creationId xmlns:a16="http://schemas.microsoft.com/office/drawing/2014/main" id="{27868C80-A922-4F3A-AB6C-E6DBEF5807E6}"/>
+              </a:ext>
+            </a:extLst>
+          </p:cNvPr>
+          <p:cNvCxnSpPr>
+            <a:cxnSpLocks/>
+            <a:stCxn id="5" idx="6"/>
+            <a:endCxn id="18" idx="1"/>
+          </p:cNvCxnSpPr>
+          <p:nvPr/>
+        </p:nvCxnSpPr>
+        <p:spPr>
+          <a:xfrm>
+            <a:off x="6713506" y="3301679"/>
+            <a:ext cx="1690056" cy="872301"/>
+          </a:xfrm>
+          <a:prstGeom prst="straightConnector1">
+            <a:avLst/>
+          </a:prstGeom>
+          <a:ln w="38100">
+            <a:solidFill>
+              <a:srgbClr val="0070C0"/>
+            </a:solidFill>
+            <a:headEnd type="arrow"/>
+            <a:tailEnd type="none"/>
+          </a:ln>
+        </p:spPr>
+        <p:style>
+          <a:lnRef idx="1">
+            <a:schemeClr val="accent1"/>
+          </a:lnRef>
+          <a:fillRef idx="0">
+            <a:schemeClr val="accent1"/>
+          </a:fillRef>
+          <a:effectRef idx="0">
+            <a:schemeClr val="accent1"/>
+          </a:effectRef>
+          <a:fontRef idx="minor">
+            <a:schemeClr val="tx1"/>
+          </a:fontRef>
+        </p:style>
+      </p:cxnSp>
+      <p:sp>
+        <p:nvSpPr>
+          <p:cNvPr id="15" name="ZoneTexte 14">
+            <a:extLst>
+              <a:ext uri="{FF2B5EF4-FFF2-40B4-BE49-F238E27FC236}">
+                <a16:creationId xmlns:a16="http://schemas.microsoft.com/office/drawing/2014/main" id="{B7077634-9536-497C-9C4C-799A0095437A}"/>
+              </a:ext>
+            </a:extLst>
+          </p:cNvPr>
+          <p:cNvSpPr txBox="1"/>
+          <p:nvPr/>
+        </p:nvSpPr>
+        <p:spPr>
+          <a:xfrm>
+            <a:off x="8516244" y="1429078"/>
+            <a:ext cx="1115947" cy="523220"/>
+          </a:xfrm>
+          <a:prstGeom prst="rect">
+            <a:avLst/>
+          </a:prstGeom>
+          <a:noFill/>
+        </p:spPr>
+        <p:txBody>
+          <a:bodyPr wrap="none" rtlCol="0">
+            <a:spAutoFit/>
+          </a:bodyPr>
+          <a:lstStyle/>
+          <a:p>
+            <a:r>
+              <a:rPr lang="en-US" sz="2800" dirty="0">
+                <a:solidFill>
+                  <a:srgbClr val="0070C0"/>
+                </a:solidFill>
+              </a:rPr>
+              <a:t>Kernel</a:t>
+            </a:r>
+          </a:p>
+        </p:txBody>
+      </p:sp>
+      <p:sp>
+        <p:nvSpPr>
+          <p:cNvPr id="17" name="ZoneTexte 16">
+            <a:extLst>
+              <a:ext uri="{FF2B5EF4-FFF2-40B4-BE49-F238E27FC236}">
+                <a16:creationId xmlns:a16="http://schemas.microsoft.com/office/drawing/2014/main" id="{8A77C8B5-74DE-4C03-9DD7-35C1B91C5F94}"/>
+              </a:ext>
+            </a:extLst>
+          </p:cNvPr>
+          <p:cNvSpPr txBox="1"/>
+          <p:nvPr/>
+        </p:nvSpPr>
+        <p:spPr>
+          <a:xfrm>
+            <a:off x="8507392" y="2581699"/>
+            <a:ext cx="1715341" cy="523220"/>
+          </a:xfrm>
+          <a:prstGeom prst="rect">
+            <a:avLst/>
+          </a:prstGeom>
+          <a:noFill/>
+        </p:spPr>
+        <p:txBody>
+          <a:bodyPr wrap="none" rtlCol="0">
+            <a:spAutoFit/>
+          </a:bodyPr>
+          <a:lstStyle/>
+          <a:p>
+            <a:r>
+              <a:rPr lang="en-US" sz="2800" dirty="0">
+                <a:solidFill>
+                  <a:srgbClr val="0070C0"/>
+                </a:solidFill>
+              </a:rPr>
+              <a:t>Cytoplasm</a:t>
+            </a:r>
+          </a:p>
+        </p:txBody>
+      </p:sp>
+      <p:sp>
+        <p:nvSpPr>
+          <p:cNvPr id="18" name="ZoneTexte 17">
+            <a:extLst>
+              <a:ext uri="{FF2B5EF4-FFF2-40B4-BE49-F238E27FC236}">
+                <a16:creationId xmlns:a16="http://schemas.microsoft.com/office/drawing/2014/main" id="{A88A297E-204E-4B65-85DD-4E682EA65D2F}"/>
+              </a:ext>
+            </a:extLst>
+          </p:cNvPr>
+          <p:cNvSpPr txBox="1"/>
+          <p:nvPr/>
+        </p:nvSpPr>
+        <p:spPr>
+          <a:xfrm>
+            <a:off x="8403562" y="3912370"/>
+            <a:ext cx="1802738" cy="523220"/>
+          </a:xfrm>
+          <a:prstGeom prst="rect">
+            <a:avLst/>
+          </a:prstGeom>
+          <a:noFill/>
+        </p:spPr>
+        <p:txBody>
+          <a:bodyPr wrap="none" rtlCol="0">
+            <a:spAutoFit/>
+          </a:bodyPr>
+          <a:lstStyle/>
+          <a:p>
+            <a:r>
+              <a:rPr lang="en-US" sz="2800" dirty="0">
+                <a:solidFill>
+                  <a:srgbClr val="0070C0"/>
+                </a:solidFill>
+              </a:rPr>
+              <a:t>Membrane</a:t>
+            </a:r>
+          </a:p>
+        </p:txBody>
+      </p:sp>
+      <p:sp>
+        <p:nvSpPr>
+          <p:cNvPr id="29" name="Forme libre : forme 28">
+            <a:extLst>
+              <a:ext uri="{FF2B5EF4-FFF2-40B4-BE49-F238E27FC236}">
+                <a16:creationId xmlns:a16="http://schemas.microsoft.com/office/drawing/2014/main" id="{C3B52BDD-CE23-413C-8855-E2A495835D6B}"/>
+              </a:ext>
+            </a:extLst>
+          </p:cNvPr>
+          <p:cNvSpPr/>
+          <p:nvPr/>
+        </p:nvSpPr>
+        <p:spPr>
+          <a:xfrm>
+            <a:off x="2974694" y="2847184"/>
+            <a:ext cx="5486400" cy="3080736"/>
+          </a:xfrm>
+          <a:custGeom>
+            <a:avLst/>
+            <a:gdLst>
+              <a:gd name="connsiteX0" fmla="*/ 5486400 w 5486400"/>
+              <a:gd name="connsiteY0" fmla="*/ 188 h 3080736"/>
+              <a:gd name="connsiteX1" fmla="*/ 4832430 w 5486400"/>
+              <a:gd name="connsiteY1" fmla="*/ 335854 h 3080736"/>
+              <a:gd name="connsiteX2" fmla="*/ 3698111 w 5486400"/>
+              <a:gd name="connsiteY2" fmla="*/ 2031545 h 3080736"/>
+              <a:gd name="connsiteX3" fmla="*/ 2708476 w 5486400"/>
+              <a:gd name="connsiteY3" fmla="*/ 2835986 h 3080736"/>
+              <a:gd name="connsiteX4" fmla="*/ 1643605 w 5486400"/>
+              <a:gd name="connsiteY4" fmla="*/ 3073267 h 3080736"/>
+              <a:gd name="connsiteX5" fmla="*/ 0 w 5486400"/>
+              <a:gd name="connsiteY5" fmla="*/ 2998031 h 3080736"/>
+            </a:gdLst>
+            <a:ahLst/>
+            <a:cxnLst>
+              <a:cxn ang="0">
+                <a:pos x="connsiteX0" y="connsiteY0"/>
+              </a:cxn>
+              <a:cxn ang="0">
+                <a:pos x="connsiteX1" y="connsiteY1"/>
+              </a:cxn>
+              <a:cxn ang="0">
+                <a:pos x="connsiteX2" y="connsiteY2"/>
+              </a:cxn>
+              <a:cxn ang="0">
+                <a:pos x="connsiteX3" y="connsiteY3"/>
+              </a:cxn>
+              <a:cxn ang="0">
+                <a:pos x="connsiteX4" y="connsiteY4"/>
+              </a:cxn>
+              <a:cxn ang="0">
+                <a:pos x="connsiteX5" y="connsiteY5"/>
+              </a:cxn>
+            </a:cxnLst>
+            <a:rect l="l" t="t" r="r" b="b"/>
+            <a:pathLst>
+              <a:path w="5486400" h="3080736">
+                <a:moveTo>
+                  <a:pt x="5486400" y="188"/>
+                </a:moveTo>
+                <a:cubicBezTo>
+                  <a:pt x="5308439" y="-1259"/>
+                  <a:pt x="5130478" y="-2705"/>
+                  <a:pt x="4832430" y="335854"/>
+                </a:cubicBezTo>
+                <a:cubicBezTo>
+                  <a:pt x="4534382" y="674413"/>
+                  <a:pt x="4052103" y="1614856"/>
+                  <a:pt x="3698111" y="2031545"/>
+                </a:cubicBezTo>
+                <a:cubicBezTo>
+                  <a:pt x="3344119" y="2448234"/>
+                  <a:pt x="3050894" y="2662366"/>
+                  <a:pt x="2708476" y="2835986"/>
+                </a:cubicBezTo>
+                <a:cubicBezTo>
+                  <a:pt x="2366058" y="3009606"/>
+                  <a:pt x="2095018" y="3046259"/>
+                  <a:pt x="1643605" y="3073267"/>
+                </a:cubicBezTo>
+                <a:cubicBezTo>
+                  <a:pt x="1192192" y="3100275"/>
+                  <a:pt x="596096" y="3049153"/>
+                  <a:pt x="0" y="2998031"/>
+                </a:cubicBezTo>
+              </a:path>
+            </a:pathLst>
+          </a:custGeom>
+          <a:noFill/>
+          <a:ln w="38100">
+            <a:solidFill>
+              <a:schemeClr val="accent1"/>
+            </a:solidFill>
+            <a:tailEnd type="arrow"/>
+          </a:ln>
+        </p:spPr>
+        <p:style>
+          <a:lnRef idx="2">
+            <a:schemeClr val="accent1">
+              <a:shade val="50000"/>
+            </a:schemeClr>
+          </a:lnRef>
+          <a:fillRef idx="1">
+            <a:schemeClr val="accent1"/>
+          </a:fillRef>
+          <a:effectRef idx="0">
+            <a:schemeClr val="accent1"/>
+          </a:effectRef>
+          <a:fontRef idx="minor">
+            <a:schemeClr val="lt1"/>
+          </a:fontRef>
+        </p:style>
+        <p:txBody>
+          <a:bodyPr rtlCol="0" anchor="ctr"/>
+          <a:lstStyle/>
+          <a:p>
+            <a:pPr algn="ctr"/>
+            <a:endParaRPr lang="fr-FR"/>
+          </a:p>
+        </p:txBody>
+      </p:sp>
+    </p:spTree>
+    <p:extLst>
+      <p:ext uri="{BB962C8B-B14F-4D97-AF65-F5344CB8AC3E}">
+        <p14:creationId xmlns:p14="http://schemas.microsoft.com/office/powerpoint/2010/main" val="978886606"/>
+      </p:ext>
+    </p:extLst>
+  </p:cSld>
+  <p:clrMapOvr>
+    <a:masterClrMapping/>
+  </p:clrMapOvr>
+  <p:timing>
+    <p:tnLst>
+      <p:par>
+        <p:cTn id="1" dur="indefinite" restart="never" nodeType="tmRoot">
+          <p:childTnLst>
+            <p:seq concurrent="1" nextAc="seek">
+              <p:cTn id="2" dur="indefinite" nodeType="mainSeq">
+                <p:childTnLst>
+                  <p:par>
+                    <p:cTn id="3" fill="hold">
+                      <p:stCondLst>
+                        <p:cond delay="indefinite"/>
+                      </p:stCondLst>
+                      <p:childTnLst>
+                        <p:par>
+                          <p:cTn id="4" fill="hold">
+                            <p:stCondLst>
+                              <p:cond delay="0"/>
+                            </p:stCondLst>
+                            <p:childTnLst>
+                              <p:par>
+                                <p:cTn id="5" presetID="10" presetClass="entr" presetSubtype="0" fill="hold" grpId="0" nodeType="clickEffect">
+                                  <p:stCondLst>
+                                    <p:cond delay="0"/>
+                                  </p:stCondLst>
+                                  <p:childTnLst>
+                                    <p:set>
+                                      <p:cBhvr>
+                                        <p:cTn id="6" dur="1" fill="hold">
+                                          <p:stCondLst>
+                                            <p:cond delay="0"/>
+                                          </p:stCondLst>
+                                        </p:cTn>
+                                        <p:tgtEl>
+                                          <p:spTgt spid="6"/>
+                                        </p:tgtEl>
+                                        <p:attrNameLst>
+                                          <p:attrName>style.visibility</p:attrName>
+                                        </p:attrNameLst>
+                                      </p:cBhvr>
+                                      <p:to>
+                                        <p:strVal val="visible"/>
+                                      </p:to>
+                                    </p:set>
+                                    <p:animEffect transition="in" filter="fade">
+                                      <p:cBhvr>
+                                        <p:cTn id="7" dur="500"/>
+                                        <p:tgtEl>
+                                          <p:spTgt spid="6"/>
+                                        </p:tgtEl>
+                                      </p:cBhvr>
+                                    </p:animEffect>
+                                  </p:childTnLst>
+                                </p:cTn>
+                              </p:par>
+                              <p:par>
+                                <p:cTn id="8" presetID="10" presetClass="entr" presetSubtype="0" fill="hold" nodeType="withEffect">
+                                  <p:stCondLst>
+                                    <p:cond delay="0"/>
+                                  </p:stCondLst>
+                                  <p:childTnLst>
+                                    <p:set>
+                                      <p:cBhvr>
+                                        <p:cTn id="9" dur="1" fill="hold">
+                                          <p:stCondLst>
+                                            <p:cond delay="0"/>
+                                          </p:stCondLst>
+                                        </p:cTn>
+                                        <p:tgtEl>
+                                          <p:spTgt spid="3"/>
+                                        </p:tgtEl>
+                                        <p:attrNameLst>
+                                          <p:attrName>style.visibility</p:attrName>
+                                        </p:attrNameLst>
+                                      </p:cBhvr>
+                                      <p:to>
+                                        <p:strVal val="visible"/>
+                                      </p:to>
+                                    </p:set>
+                                    <p:animEffect transition="in" filter="fade">
+                                      <p:cBhvr>
+                                        <p:cTn id="10" dur="500"/>
+                                        <p:tgtEl>
+                                          <p:spTgt spid="3"/>
+                                        </p:tgtEl>
+                                      </p:cBhvr>
+                                    </p:animEffect>
+                                  </p:childTnLst>
+                                </p:cTn>
+                              </p:par>
+                              <p:par>
+                                <p:cTn id="11" presetID="10" presetClass="entr" presetSubtype="0" fill="hold" grpId="0" nodeType="withEffect">
+                                  <p:stCondLst>
+                                    <p:cond delay="0"/>
+                                  </p:stCondLst>
+                                  <p:childTnLst>
+                                    <p:set>
+                                      <p:cBhvr>
+                                        <p:cTn id="12" dur="1" fill="hold">
+                                          <p:stCondLst>
+                                            <p:cond delay="0"/>
+                                          </p:stCondLst>
+                                        </p:cTn>
+                                        <p:tgtEl>
+                                          <p:spTgt spid="15"/>
+                                        </p:tgtEl>
+                                        <p:attrNameLst>
+                                          <p:attrName>style.visibility</p:attrName>
+                                        </p:attrNameLst>
+                                      </p:cBhvr>
+                                      <p:to>
+                                        <p:strVal val="visible"/>
+                                      </p:to>
+                                    </p:set>
+                                    <p:animEffect transition="in" filter="fade">
+                                      <p:cBhvr>
+                                        <p:cTn id="13" dur="500"/>
+                                        <p:tgtEl>
+                                          <p:spTgt spid="15"/>
+                                        </p:tgtEl>
+                                      </p:cBhvr>
+                                    </p:animEffect>
+                                  </p:childTnLst>
+                                </p:cTn>
+                              </p:par>
+                            </p:childTnLst>
+                          </p:cTn>
+                        </p:par>
+                      </p:childTnLst>
+                    </p:cTn>
+                  </p:par>
+                  <p:par>
+                    <p:cTn id="14" fill="hold">
+                      <p:stCondLst>
+                        <p:cond delay="indefinite"/>
+                      </p:stCondLst>
+                      <p:childTnLst>
+                        <p:par>
+                          <p:cTn id="15" fill="hold">
+                            <p:stCondLst>
+                              <p:cond delay="0"/>
+                            </p:stCondLst>
+                            <p:childTnLst>
+                              <p:par>
+                                <p:cTn id="16" presetID="10" presetClass="entr" presetSubtype="0" fill="hold" grpId="0" nodeType="clickEffect">
+                                  <p:stCondLst>
+                                    <p:cond delay="0"/>
+                                  </p:stCondLst>
+                                  <p:childTnLst>
+                                    <p:set>
+                                      <p:cBhvr>
+                                        <p:cTn id="17" dur="1" fill="hold">
+                                          <p:stCondLst>
+                                            <p:cond delay="0"/>
+                                          </p:stCondLst>
+                                        </p:cTn>
+                                        <p:tgtEl>
+                                          <p:spTgt spid="5"/>
+                                        </p:tgtEl>
+                                        <p:attrNameLst>
+                                          <p:attrName>style.visibility</p:attrName>
+                                        </p:attrNameLst>
+                                      </p:cBhvr>
+                                      <p:to>
+                                        <p:strVal val="visible"/>
+                                      </p:to>
+                                    </p:set>
+                                    <p:animEffect transition="in" filter="fade">
+                                      <p:cBhvr>
+                                        <p:cTn id="18" dur="500"/>
+                                        <p:tgtEl>
+                                          <p:spTgt spid="5"/>
+                                        </p:tgtEl>
+                                      </p:cBhvr>
+                                    </p:animEffect>
+                                  </p:childTnLst>
+                                </p:cTn>
+                              </p:par>
+                              <p:par>
+                                <p:cTn id="19" presetID="10" presetClass="entr" presetSubtype="0" fill="hold" nodeType="withEffect">
+                                  <p:stCondLst>
+                                    <p:cond delay="0"/>
+                                  </p:stCondLst>
+                                  <p:childTnLst>
+                                    <p:set>
+                                      <p:cBhvr>
+                                        <p:cTn id="20" dur="1" fill="hold">
+                                          <p:stCondLst>
+                                            <p:cond delay="0"/>
+                                          </p:stCondLst>
+                                        </p:cTn>
+                                        <p:tgtEl>
+                                          <p:spTgt spid="8"/>
+                                        </p:tgtEl>
+                                        <p:attrNameLst>
+                                          <p:attrName>style.visibility</p:attrName>
+                                        </p:attrNameLst>
+                                      </p:cBhvr>
+                                      <p:to>
+                                        <p:strVal val="visible"/>
+                                      </p:to>
+                                    </p:set>
+                                    <p:animEffect transition="in" filter="fade">
+                                      <p:cBhvr>
+                                        <p:cTn id="21" dur="500"/>
+                                        <p:tgtEl>
+                                          <p:spTgt spid="8"/>
+                                        </p:tgtEl>
+                                      </p:cBhvr>
+                                    </p:animEffect>
+                                  </p:childTnLst>
+                                </p:cTn>
+                              </p:par>
+                              <p:par>
+                                <p:cTn id="22" presetID="10" presetClass="entr" presetSubtype="0" fill="hold" grpId="0" nodeType="withEffect">
+                                  <p:stCondLst>
+                                    <p:cond delay="0"/>
+                                  </p:stCondLst>
+                                  <p:childTnLst>
+                                    <p:set>
+                                      <p:cBhvr>
+                                        <p:cTn id="23" dur="1" fill="hold">
+                                          <p:stCondLst>
+                                            <p:cond delay="0"/>
+                                          </p:stCondLst>
+                                        </p:cTn>
+                                        <p:tgtEl>
+                                          <p:spTgt spid="18"/>
+                                        </p:tgtEl>
+                                        <p:attrNameLst>
+                                          <p:attrName>style.visibility</p:attrName>
+                                        </p:attrNameLst>
+                                      </p:cBhvr>
+                                      <p:to>
+                                        <p:strVal val="visible"/>
+                                      </p:to>
+                                    </p:set>
+                                    <p:animEffect transition="in" filter="fade">
+                                      <p:cBhvr>
+                                        <p:cTn id="24" dur="500"/>
+                                        <p:tgtEl>
+                                          <p:spTgt spid="18"/>
+                                        </p:tgtEl>
+                                      </p:cBhvr>
+                                    </p:animEffect>
+                                  </p:childTnLst>
+                                </p:cTn>
+                              </p:par>
+                            </p:childTnLst>
+                          </p:cTn>
+                        </p:par>
+                      </p:childTnLst>
+                    </p:cTn>
+                  </p:par>
+                  <p:par>
+                    <p:cTn id="25" fill="hold">
+                      <p:stCondLst>
+                        <p:cond delay="indefinite"/>
+                      </p:stCondLst>
+                      <p:childTnLst>
+                        <p:par>
+                          <p:cTn id="26" fill="hold">
+                            <p:stCondLst>
+                              <p:cond delay="0"/>
+                            </p:stCondLst>
+                            <p:childTnLst>
+                              <p:par>
+                                <p:cTn id="27" presetID="10" presetClass="entr" presetSubtype="0" fill="hold" grpId="0" nodeType="clickEffect">
+                                  <p:stCondLst>
+                                    <p:cond delay="0"/>
+                                  </p:stCondLst>
+                                  <p:childTnLst>
+                                    <p:set>
+                                      <p:cBhvr>
+                                        <p:cTn id="28" dur="1" fill="hold">
+                                          <p:stCondLst>
+                                            <p:cond delay="0"/>
+                                          </p:stCondLst>
+                                        </p:cTn>
+                                        <p:tgtEl>
+                                          <p:spTgt spid="29"/>
+                                        </p:tgtEl>
+                                        <p:attrNameLst>
+                                          <p:attrName>style.visibility</p:attrName>
+                                        </p:attrNameLst>
+                                      </p:cBhvr>
+                                      <p:to>
+                                        <p:strVal val="visible"/>
+                                      </p:to>
+                                    </p:set>
+                                    <p:animEffect transition="in" filter="fade">
+                                      <p:cBhvr>
+                                        <p:cTn id="29" dur="500"/>
+                                        <p:tgtEl>
+                                          <p:spTgt spid="29"/>
+                                        </p:tgtEl>
+                                      </p:cBhvr>
+                                    </p:animEffect>
+                                  </p:childTnLst>
+                                </p:cTn>
+                              </p:par>
+                              <p:par>
+                                <p:cTn id="30" presetID="10" presetClass="entr" presetSubtype="0" fill="hold" grpId="0" nodeType="withEffect">
+                                  <p:stCondLst>
+                                    <p:cond delay="0"/>
+                                  </p:stCondLst>
+                                  <p:childTnLst>
+                                    <p:set>
+                                      <p:cBhvr>
+                                        <p:cTn id="31" dur="1" fill="hold">
+                                          <p:stCondLst>
+                                            <p:cond delay="0"/>
+                                          </p:stCondLst>
+                                        </p:cTn>
+                                        <p:tgtEl>
+                                          <p:spTgt spid="17"/>
+                                        </p:tgtEl>
+                                        <p:attrNameLst>
+                                          <p:attrName>style.visibility</p:attrName>
+                                        </p:attrNameLst>
+                                      </p:cBhvr>
+                                      <p:to>
+                                        <p:strVal val="visible"/>
+                                      </p:to>
+                                    </p:set>
+                                    <p:animEffect transition="in" filter="fade">
+                                      <p:cBhvr>
+                                        <p:cTn id="32" dur="500"/>
+                                        <p:tgtEl>
+                                          <p:spTgt spid="17"/>
+                                        </p:tgtEl>
+                                      </p:cBhvr>
+                                    </p:animEffect>
+                                  </p:childTnLst>
+                                </p:cTn>
+                              </p:par>
+                            </p:childTnLst>
+                          </p:cTn>
+                        </p:par>
+                      </p:childTnLst>
+                    </p:cTn>
+                  </p:par>
+                </p:childTnLst>
+              </p:cTn>
+              <p:prevCondLst>
+                <p:cond evt="onPrev" delay="0">
+                  <p:tgtEl>
+                    <p:sldTgt/>
+                  </p:tgtEl>
+                </p:cond>
+              </p:prevCondLst>
+              <p:nextCondLst>
+                <p:cond evt="onNext" delay="0">
+                  <p:tgtEl>
+                    <p:sldTgt/>
+                  </p:tgtEl>
+                </p:cond>
+              </p:nextCondLst>
+            </p:seq>
+          </p:childTnLst>
+        </p:cTn>
+      </p:par>
+    </p:tnLst>
+    <p:bldLst>
+      <p:bldP spid="5" grpId="0" animBg="1"/>
+      <p:bldP spid="6" grpId="0" animBg="1"/>
+      <p:bldP spid="15" grpId="0"/>
+      <p:bldP spid="17" grpId="0"/>
+      <p:bldP spid="18" grpId="0"/>
+      <p:bldP spid="29" grpId="0" animBg="1"/>
+    </p:bldLst>
+  </p:timing>
 </p:sld>
 </file>
 

</xml_diff>